<commit_message>
Update Remote attacks and backdoors.pptx
Still working on the presentation. Posting the updated version
</commit_message>
<xml_diff>
--- a/Documents/Remote attacks and backdoors.pptx
+++ b/Documents/Remote attacks and backdoors.pptx
@@ -7,12 +7,17 @@
   <p:sldIdLst>
     <p:sldId id="257" r:id="rId5"/>
     <p:sldId id="266" r:id="rId6"/>
-    <p:sldId id="265" r:id="rId7"/>
-    <p:sldId id="262" r:id="rId8"/>
-    <p:sldId id="263" r:id="rId9"/>
-    <p:sldId id="268" r:id="rId10"/>
-    <p:sldId id="264" r:id="rId11"/>
-    <p:sldId id="267" r:id="rId12"/>
+    <p:sldId id="263" r:id="rId7"/>
+    <p:sldId id="265" r:id="rId8"/>
+    <p:sldId id="269" r:id="rId9"/>
+    <p:sldId id="270" r:id="rId10"/>
+    <p:sldId id="271" r:id="rId11"/>
+    <p:sldId id="272" r:id="rId12"/>
+    <p:sldId id="273" r:id="rId13"/>
+    <p:sldId id="262" r:id="rId14"/>
+    <p:sldId id="274" r:id="rId15"/>
+    <p:sldId id="264" r:id="rId16"/>
+    <p:sldId id="267" r:id="rId17"/>
   </p:sldIdLst>
   <p:sldSz cx="12192000" cy="6858000"/>
   <p:notesSz cx="6858000" cy="9144000"/>
@@ -122,7 +127,7 @@
 <file path=ppt/revisionInfo.xml><?xml version="1.0" encoding="utf-8"?>
 <p1510:revInfo xmlns:a="http://schemas.openxmlformats.org/drawingml/2006/main" xmlns:r="http://schemas.openxmlformats.org/officeDocument/2006/relationships" xmlns:p1510="http://schemas.microsoft.com/office/powerpoint/2015/10/main">
   <p1510:revLst>
-    <p1510:client id="{0E6B5D30-E784-4DA3-A1ED-8FFBBF9A845B}" v="25" dt="2020-04-22T22:24:17.755"/>
+    <p1510:client id="{0E6B5D30-E784-4DA3-A1ED-8FFBBF9A845B}" v="62" dt="2020-05-01T00:24:31.146"/>
   </p1510:revLst>
 </p1510:revInfo>
 </file>
@@ -596,7 +601,7 @@
           <a:p>
             <a:fld id="{EA0C0817-A112-4847-8014-A94B7D2A4EA3}" type="datetime1">
               <a:rPr lang="en-US" smtClean="0"/>
-              <a:t>4/22/2020</a:t>
+              <a:t>4/29/2020</a:t>
             </a:fld>
             <a:endParaRPr lang="en-US" dirty="0"/>
           </a:p>
@@ -798,7 +803,7 @@
           <a:p>
             <a:fld id="{7332B432-ACDA-4023-A761-2BAB76577B62}" type="datetime1">
               <a:rPr lang="en-US" smtClean="0"/>
-              <a:t>4/22/2020</a:t>
+              <a:t>4/29/2020</a:t>
             </a:fld>
             <a:endParaRPr lang="en-US" dirty="0"/>
           </a:p>
@@ -1397,7 +1402,7 @@
           <a:p>
             <a:fld id="{D9C646AA-F36E-4540-911D-FFFC0A0EF24A}" type="datetime1">
               <a:rPr lang="en-US" smtClean="0"/>
-              <a:t>4/22/2020</a:t>
+              <a:t>4/29/2020</a:t>
             </a:fld>
             <a:endParaRPr lang="en-US" dirty="0"/>
           </a:p>
@@ -1717,7 +1722,7 @@
           <a:p>
             <a:fld id="{69186D26-FA5F-4637-B602-B7C2DC34CFD4}" type="datetime1">
               <a:rPr lang="en-US" smtClean="0"/>
-              <a:t>4/22/2020</a:t>
+              <a:t>4/29/2020</a:t>
             </a:fld>
             <a:endParaRPr lang="en-US" dirty="0"/>
           </a:p>
@@ -2154,7 +2159,7 @@
           <a:p>
             <a:fld id="{8A7F15D8-96D1-4781-BC50-CA8A088B2FE4}" type="datetime1">
               <a:rPr lang="en-US" smtClean="0"/>
-              <a:t>4/22/2020</a:t>
+              <a:t>4/29/2020</a:t>
             </a:fld>
             <a:endParaRPr lang="en-US" dirty="0"/>
           </a:p>
@@ -2272,7 +2277,7 @@
           <a:p>
             <a:fld id="{F9A96C99-B8F8-4528-BD05-0E16E943DC09}" type="datetime1">
               <a:rPr lang="en-US" smtClean="0"/>
-              <a:t>4/22/2020</a:t>
+              <a:t>4/29/2020</a:t>
             </a:fld>
             <a:endParaRPr lang="en-US" dirty="0"/>
           </a:p>
@@ -2367,7 +2372,7 @@
           <a:p>
             <a:fld id="{03636942-C211-4B28-8DBD-C953E00AF71B}" type="datetime1">
               <a:rPr lang="en-US" smtClean="0"/>
-              <a:t>4/22/2020</a:t>
+              <a:t>4/29/2020</a:t>
             </a:fld>
             <a:endParaRPr lang="en-US" dirty="0"/>
           </a:p>
@@ -2784,7 +2789,7 @@
           <a:p>
             <a:fld id="{7E8D12A6-918A-48BD-8CB9-CA713993B0EA}" type="datetime1">
               <a:rPr lang="en-US" smtClean="0"/>
-              <a:t>4/22/2020</a:t>
+              <a:t>4/29/2020</a:t>
             </a:fld>
             <a:endParaRPr lang="en-US" dirty="0"/>
           </a:p>
@@ -3046,7 +3051,7 @@
             <a:fld id="{E778CE86-875F-4587-BCF6-FA054AFC0D53}" type="datetime1">
               <a:rPr lang="en-US" smtClean="0"/>
               <a:pPr/>
-              <a:t>4/22/2020</a:t>
+              <a:t>4/29/2020</a:t>
             </a:fld>
             <a:endParaRPr lang="en-US" dirty="0"/>
           </a:p>
@@ -3562,7 +3567,7 @@
           <a:p>
             <a:fld id="{F6FA2B21-3FCD-4721-B95C-427943F61125}" type="datetime1">
               <a:rPr lang="en-US" smtClean="0"/>
-              <a:t>4/22/2020</a:t>
+              <a:t>4/29/2020</a:t>
             </a:fld>
             <a:endParaRPr lang="en-US" dirty="0"/>
           </a:p>
@@ -4318,6 +4323,753 @@
 </p:sld>
 </file>
 
+<file path=ppt/slides/slide10.xml><?xml version="1.0" encoding="utf-8"?>
+<p:sld xmlns:a="http://schemas.openxmlformats.org/drawingml/2006/main" xmlns:r="http://schemas.openxmlformats.org/officeDocument/2006/relationships" xmlns:p="http://schemas.openxmlformats.org/presentationml/2006/main">
+  <p:cSld>
+    <p:spTree>
+      <p:nvGrpSpPr>
+        <p:cNvPr id="1" name=""/>
+        <p:cNvGrpSpPr/>
+        <p:nvPr/>
+      </p:nvGrpSpPr>
+      <p:grpSpPr>
+        <a:xfrm>
+          <a:off x="0" y="0"/>
+          <a:ext cx="0" cy="0"/>
+          <a:chOff x="0" y="0"/>
+          <a:chExt cx="0" cy="0"/>
+        </a:xfrm>
+      </p:grpSpPr>
+      <p:sp>
+        <p:nvSpPr>
+          <p:cNvPr id="2" name="Title 1">
+            <a:extLst>
+              <a:ext uri="{FF2B5EF4-FFF2-40B4-BE49-F238E27FC236}">
+                <a16:creationId xmlns:a16="http://schemas.microsoft.com/office/drawing/2014/main" id="{1E6B5280-EAE4-4C46-B558-2BDAFE74E44B}"/>
+              </a:ext>
+            </a:extLst>
+          </p:cNvPr>
+          <p:cNvSpPr>
+            <a:spLocks noGrp="1"/>
+          </p:cNvSpPr>
+          <p:nvPr>
+            <p:ph type="title"/>
+          </p:nvPr>
+        </p:nvSpPr>
+        <p:spPr>
+          <a:xfrm>
+            <a:off x="1066800" y="382516"/>
+            <a:ext cx="10058400" cy="1371600"/>
+          </a:xfrm>
+        </p:spPr>
+        <p:txBody>
+          <a:bodyPr/>
+          <a:lstStyle/>
+          <a:p>
+            <a:pPr algn="ctr"/>
+            <a:r>
+              <a:rPr lang="en-US" dirty="0"/>
+              <a:t>Payload contents explanation</a:t>
+            </a:r>
+          </a:p>
+        </p:txBody>
+      </p:sp>
+      <p:pic>
+        <p:nvPicPr>
+          <p:cNvPr id="4" name="Content Placeholder 3">
+            <a:extLst>
+              <a:ext uri="{FF2B5EF4-FFF2-40B4-BE49-F238E27FC236}">
+                <a16:creationId xmlns:a16="http://schemas.microsoft.com/office/drawing/2014/main" id="{3E70FE87-B349-45FB-BFF1-82A7B180162A}"/>
+              </a:ext>
+            </a:extLst>
+          </p:cNvPr>
+          <p:cNvPicPr>
+            <a:picLocks noGrp="1" noChangeAspect="1"/>
+          </p:cNvPicPr>
+          <p:nvPr>
+            <p:ph idx="1"/>
+          </p:nvPr>
+        </p:nvPicPr>
+        <p:blipFill>
+          <a:blip r:embed="rId2"/>
+          <a:stretch>
+            <a:fillRect/>
+          </a:stretch>
+        </p:blipFill>
+        <p:spPr>
+          <a:xfrm>
+            <a:off x="2191364" y="1836448"/>
+            <a:ext cx="2576052" cy="760617"/>
+          </a:xfrm>
+          <a:prstGeom prst="rect">
+            <a:avLst/>
+          </a:prstGeom>
+        </p:spPr>
+      </p:pic>
+      <p:sp>
+        <p:nvSpPr>
+          <p:cNvPr id="5" name="TextBox 4">
+            <a:extLst>
+              <a:ext uri="{FF2B5EF4-FFF2-40B4-BE49-F238E27FC236}">
+                <a16:creationId xmlns:a16="http://schemas.microsoft.com/office/drawing/2014/main" id="{16D49123-56B3-4F38-90F3-94DBA282165C}"/>
+              </a:ext>
+            </a:extLst>
+          </p:cNvPr>
+          <p:cNvSpPr txBox="1"/>
+          <p:nvPr/>
+        </p:nvSpPr>
+        <p:spPr>
+          <a:xfrm>
+            <a:off x="6786717" y="1859665"/>
+            <a:ext cx="3347884" cy="646331"/>
+          </a:xfrm>
+          <a:prstGeom prst="rect">
+            <a:avLst/>
+          </a:prstGeom>
+          <a:noFill/>
+        </p:spPr>
+        <p:txBody>
+          <a:bodyPr wrap="square" rtlCol="0">
+            <a:spAutoFit/>
+          </a:bodyPr>
+          <a:lstStyle/>
+          <a:p>
+            <a:r>
+              <a:rPr lang="en-US" dirty="0"/>
+              <a:t>Create a hidden directory and work inside the new </a:t>
+            </a:r>
+            <a:r>
+              <a:rPr lang="en-US" dirty="0" err="1"/>
+              <a:t>dir</a:t>
+            </a:r>
+            <a:endParaRPr lang="en-US" dirty="0"/>
+          </a:p>
+        </p:txBody>
+      </p:sp>
+      <p:pic>
+        <p:nvPicPr>
+          <p:cNvPr id="6" name="Picture 5">
+            <a:extLst>
+              <a:ext uri="{FF2B5EF4-FFF2-40B4-BE49-F238E27FC236}">
+                <a16:creationId xmlns:a16="http://schemas.microsoft.com/office/drawing/2014/main" id="{636AE451-C56F-4BA9-8977-02A9CC316882}"/>
+              </a:ext>
+            </a:extLst>
+          </p:cNvPr>
+          <p:cNvPicPr>
+            <a:picLocks noChangeAspect="1"/>
+          </p:cNvPicPr>
+          <p:nvPr/>
+        </p:nvPicPr>
+        <p:blipFill>
+          <a:blip r:embed="rId3"/>
+          <a:stretch>
+            <a:fillRect/>
+          </a:stretch>
+        </p:blipFill>
+        <p:spPr>
+          <a:xfrm>
+            <a:off x="395748" y="2928495"/>
+            <a:ext cx="6440129" cy="803314"/>
+          </a:xfrm>
+          <a:prstGeom prst="rect">
+            <a:avLst/>
+          </a:prstGeom>
+        </p:spPr>
+      </p:pic>
+      <p:sp>
+        <p:nvSpPr>
+          <p:cNvPr id="7" name="TextBox 6">
+            <a:extLst>
+              <a:ext uri="{FF2B5EF4-FFF2-40B4-BE49-F238E27FC236}">
+                <a16:creationId xmlns:a16="http://schemas.microsoft.com/office/drawing/2014/main" id="{ABFC75A5-7834-4764-A363-A7E7412211FF}"/>
+              </a:ext>
+            </a:extLst>
+          </p:cNvPr>
+          <p:cNvSpPr txBox="1"/>
+          <p:nvPr/>
+        </p:nvSpPr>
+        <p:spPr>
+          <a:xfrm>
+            <a:off x="7975191" y="2828835"/>
+            <a:ext cx="3821061" cy="1200329"/>
+          </a:xfrm>
+          <a:prstGeom prst="rect">
+            <a:avLst/>
+          </a:prstGeom>
+          <a:noFill/>
+        </p:spPr>
+        <p:txBody>
+          <a:bodyPr wrap="square" rtlCol="0">
+            <a:spAutoFit/>
+          </a:bodyPr>
+          <a:lstStyle/>
+          <a:p>
+            <a:r>
+              <a:rPr lang="en-US" dirty="0"/>
+              <a:t>Create the file </a:t>
+            </a:r>
+            <a:r>
+              <a:rPr lang="en-US" b="1" dirty="0" err="1"/>
+              <a:t>shell.cgi</a:t>
+            </a:r>
+            <a:r>
+              <a:rPr lang="en-US" dirty="0"/>
+              <a:t>. Echo the payload and redirect the output to </a:t>
+            </a:r>
+            <a:r>
+              <a:rPr lang="en-US" b="1" dirty="0" err="1"/>
+              <a:t>shell.cgi</a:t>
+            </a:r>
+            <a:r>
+              <a:rPr lang="en-US" dirty="0"/>
+              <a:t>. Give it all permissions. </a:t>
+            </a:r>
+          </a:p>
+        </p:txBody>
+      </p:sp>
+      <p:pic>
+        <p:nvPicPr>
+          <p:cNvPr id="8" name="Picture 7">
+            <a:extLst>
+              <a:ext uri="{FF2B5EF4-FFF2-40B4-BE49-F238E27FC236}">
+                <a16:creationId xmlns:a16="http://schemas.microsoft.com/office/drawing/2014/main" id="{639C5112-D1BD-47C4-822D-97F5BCF5A4F4}"/>
+              </a:ext>
+            </a:extLst>
+          </p:cNvPr>
+          <p:cNvPicPr>
+            <a:picLocks noChangeAspect="1"/>
+          </p:cNvPicPr>
+          <p:nvPr/>
+        </p:nvPicPr>
+        <p:blipFill>
+          <a:blip r:embed="rId4"/>
+          <a:stretch>
+            <a:fillRect/>
+          </a:stretch>
+        </p:blipFill>
+        <p:spPr>
+          <a:xfrm>
+            <a:off x="775519" y="4488122"/>
+            <a:ext cx="5680585" cy="1330588"/>
+          </a:xfrm>
+          <a:prstGeom prst="rect">
+            <a:avLst/>
+          </a:prstGeom>
+        </p:spPr>
+      </p:pic>
+      <p:sp>
+        <p:nvSpPr>
+          <p:cNvPr id="9" name="TextBox 8">
+            <a:extLst>
+              <a:ext uri="{FF2B5EF4-FFF2-40B4-BE49-F238E27FC236}">
+                <a16:creationId xmlns:a16="http://schemas.microsoft.com/office/drawing/2014/main" id="{58F99AB4-0D82-4291-84A0-00D58871FC35}"/>
+              </a:ext>
+            </a:extLst>
+          </p:cNvPr>
+          <p:cNvSpPr txBox="1"/>
+          <p:nvPr/>
+        </p:nvSpPr>
+        <p:spPr>
+          <a:xfrm>
+            <a:off x="5891980" y="1978788"/>
+            <a:ext cx="943897" cy="369332"/>
+          </a:xfrm>
+          <a:prstGeom prst="rect">
+            <a:avLst/>
+          </a:prstGeom>
+          <a:noFill/>
+        </p:spPr>
+        <p:txBody>
+          <a:bodyPr wrap="square" rtlCol="0">
+            <a:spAutoFit/>
+          </a:bodyPr>
+          <a:lstStyle/>
+          <a:p>
+            <a:r>
+              <a:rPr lang="en-US" b="1" dirty="0"/>
+              <a:t>Step 1:</a:t>
+            </a:r>
+          </a:p>
+        </p:txBody>
+      </p:sp>
+      <p:sp>
+        <p:nvSpPr>
+          <p:cNvPr id="10" name="TextBox 9">
+            <a:extLst>
+              <a:ext uri="{FF2B5EF4-FFF2-40B4-BE49-F238E27FC236}">
+                <a16:creationId xmlns:a16="http://schemas.microsoft.com/office/drawing/2014/main" id="{173AC370-F037-4030-B729-6D33DD17BB8B}"/>
+              </a:ext>
+            </a:extLst>
+          </p:cNvPr>
+          <p:cNvSpPr txBox="1"/>
+          <p:nvPr/>
+        </p:nvSpPr>
+        <p:spPr>
+          <a:xfrm>
+            <a:off x="7123471" y="3145486"/>
+            <a:ext cx="943897" cy="369332"/>
+          </a:xfrm>
+          <a:prstGeom prst="rect">
+            <a:avLst/>
+          </a:prstGeom>
+          <a:noFill/>
+        </p:spPr>
+        <p:txBody>
+          <a:bodyPr wrap="square" rtlCol="0">
+            <a:spAutoFit/>
+          </a:bodyPr>
+          <a:lstStyle/>
+          <a:p>
+            <a:r>
+              <a:rPr lang="en-US" b="1" dirty="0"/>
+              <a:t>Step 2:</a:t>
+            </a:r>
+          </a:p>
+        </p:txBody>
+      </p:sp>
+      <p:sp>
+        <p:nvSpPr>
+          <p:cNvPr id="12" name="TextBox 11">
+            <a:extLst>
+              <a:ext uri="{FF2B5EF4-FFF2-40B4-BE49-F238E27FC236}">
+                <a16:creationId xmlns:a16="http://schemas.microsoft.com/office/drawing/2014/main" id="{71D17B9F-6B37-457E-868E-0A881C5A1DF3}"/>
+              </a:ext>
+            </a:extLst>
+          </p:cNvPr>
+          <p:cNvSpPr txBox="1"/>
+          <p:nvPr/>
+        </p:nvSpPr>
+        <p:spPr>
+          <a:xfrm>
+            <a:off x="7097662" y="4968750"/>
+            <a:ext cx="943897" cy="369332"/>
+          </a:xfrm>
+          <a:prstGeom prst="rect">
+            <a:avLst/>
+          </a:prstGeom>
+          <a:noFill/>
+        </p:spPr>
+        <p:txBody>
+          <a:bodyPr wrap="square" rtlCol="0">
+            <a:spAutoFit/>
+          </a:bodyPr>
+          <a:lstStyle/>
+          <a:p>
+            <a:r>
+              <a:rPr lang="en-US" b="1" dirty="0"/>
+              <a:t>Step 3:</a:t>
+            </a:r>
+          </a:p>
+        </p:txBody>
+      </p:sp>
+      <p:sp>
+        <p:nvSpPr>
+          <p:cNvPr id="13" name="TextBox 12">
+            <a:extLst>
+              <a:ext uri="{FF2B5EF4-FFF2-40B4-BE49-F238E27FC236}">
+                <a16:creationId xmlns:a16="http://schemas.microsoft.com/office/drawing/2014/main" id="{5D0AF8AC-9703-4E84-B5DD-167B64D94B07}"/>
+              </a:ext>
+            </a:extLst>
+          </p:cNvPr>
+          <p:cNvSpPr txBox="1"/>
+          <p:nvPr/>
+        </p:nvSpPr>
+        <p:spPr>
+          <a:xfrm>
+            <a:off x="7898991" y="4390850"/>
+            <a:ext cx="3821061" cy="1754326"/>
+          </a:xfrm>
+          <a:prstGeom prst="rect">
+            <a:avLst/>
+          </a:prstGeom>
+          <a:noFill/>
+        </p:spPr>
+        <p:txBody>
+          <a:bodyPr wrap="square" rtlCol="0">
+            <a:spAutoFit/>
+          </a:bodyPr>
+          <a:lstStyle/>
+          <a:p>
+            <a:r>
+              <a:rPr lang="en-US" dirty="0"/>
+              <a:t>Create a temporary file and store a crontab command there to execute the payload every minute. Then redirect the file as stdin to crontab. remove the temporary file.</a:t>
+            </a:r>
+          </a:p>
+        </p:txBody>
+      </p:sp>
+    </p:spTree>
+    <p:extLst>
+      <p:ext uri="{BB962C8B-B14F-4D97-AF65-F5344CB8AC3E}">
+        <p14:creationId xmlns:p14="http://schemas.microsoft.com/office/powerpoint/2010/main" val="1569030625"/>
+      </p:ext>
+    </p:extLst>
+  </p:cSld>
+  <p:clrMapOvr>
+    <a:masterClrMapping/>
+  </p:clrMapOvr>
+</p:sld>
+</file>
+
+<file path=ppt/slides/slide11.xml><?xml version="1.0" encoding="utf-8"?>
+<p:sld xmlns:a="http://schemas.openxmlformats.org/drawingml/2006/main" xmlns:r="http://schemas.openxmlformats.org/officeDocument/2006/relationships" xmlns:p="http://schemas.openxmlformats.org/presentationml/2006/main">
+  <p:cSld>
+    <p:spTree>
+      <p:nvGrpSpPr>
+        <p:cNvPr id="1" name=""/>
+        <p:cNvGrpSpPr/>
+        <p:nvPr/>
+      </p:nvGrpSpPr>
+      <p:grpSpPr>
+        <a:xfrm>
+          <a:off x="0" y="0"/>
+          <a:ext cx="0" cy="0"/>
+          <a:chOff x="0" y="0"/>
+          <a:chExt cx="0" cy="0"/>
+        </a:xfrm>
+      </p:grpSpPr>
+      <p:sp>
+        <p:nvSpPr>
+          <p:cNvPr id="2" name="Title 1">
+            <a:extLst>
+              <a:ext uri="{FF2B5EF4-FFF2-40B4-BE49-F238E27FC236}">
+                <a16:creationId xmlns:a16="http://schemas.microsoft.com/office/drawing/2014/main" id="{4CD00E24-6056-4F28-ABF5-B16BA40A7EB1}"/>
+              </a:ext>
+            </a:extLst>
+          </p:cNvPr>
+          <p:cNvSpPr>
+            <a:spLocks noGrp="1"/>
+          </p:cNvSpPr>
+          <p:nvPr>
+            <p:ph type="title"/>
+          </p:nvPr>
+        </p:nvSpPr>
+        <p:spPr/>
+        <p:txBody>
+          <a:bodyPr/>
+          <a:lstStyle/>
+          <a:p>
+            <a:r>
+              <a:rPr lang="en-US" dirty="0"/>
+              <a:t>How to gain entry using the backdoor</a:t>
+            </a:r>
+          </a:p>
+        </p:txBody>
+      </p:sp>
+      <p:sp>
+        <p:nvSpPr>
+          <p:cNvPr id="3" name="Content Placeholder 2">
+            <a:extLst>
+              <a:ext uri="{FF2B5EF4-FFF2-40B4-BE49-F238E27FC236}">
+                <a16:creationId xmlns:a16="http://schemas.microsoft.com/office/drawing/2014/main" id="{2228875F-9358-4271-9BBE-90829BC34673}"/>
+              </a:ext>
+            </a:extLst>
+          </p:cNvPr>
+          <p:cNvSpPr>
+            <a:spLocks noGrp="1"/>
+          </p:cNvSpPr>
+          <p:nvPr>
+            <p:ph idx="1"/>
+          </p:nvPr>
+        </p:nvSpPr>
+        <p:spPr/>
+        <p:txBody>
+          <a:bodyPr/>
+          <a:lstStyle/>
+          <a:p>
+            <a:endParaRPr lang="en-US" dirty="0"/>
+          </a:p>
+        </p:txBody>
+      </p:sp>
+    </p:spTree>
+    <p:extLst>
+      <p:ext uri="{BB962C8B-B14F-4D97-AF65-F5344CB8AC3E}">
+        <p14:creationId xmlns:p14="http://schemas.microsoft.com/office/powerpoint/2010/main" val="4256713488"/>
+      </p:ext>
+    </p:extLst>
+  </p:cSld>
+  <p:clrMapOvr>
+    <a:masterClrMapping/>
+  </p:clrMapOvr>
+</p:sld>
+</file>
+
+<file path=ppt/slides/slide12.xml><?xml version="1.0" encoding="utf-8"?>
+<p:sld xmlns:a="http://schemas.openxmlformats.org/drawingml/2006/main" xmlns:r="http://schemas.openxmlformats.org/officeDocument/2006/relationships" xmlns:p="http://schemas.openxmlformats.org/presentationml/2006/main">
+  <p:cSld>
+    <p:spTree>
+      <p:nvGrpSpPr>
+        <p:cNvPr id="1" name=""/>
+        <p:cNvGrpSpPr/>
+        <p:nvPr/>
+      </p:nvGrpSpPr>
+      <p:grpSpPr>
+        <a:xfrm>
+          <a:off x="0" y="0"/>
+          <a:ext cx="0" cy="0"/>
+          <a:chOff x="0" y="0"/>
+          <a:chExt cx="0" cy="0"/>
+        </a:xfrm>
+      </p:grpSpPr>
+      <p:sp>
+        <p:nvSpPr>
+          <p:cNvPr id="2" name="Title 1">
+            <a:extLst>
+              <a:ext uri="{FF2B5EF4-FFF2-40B4-BE49-F238E27FC236}">
+                <a16:creationId xmlns:a16="http://schemas.microsoft.com/office/drawing/2014/main" id="{6ECE95BE-A37B-4AEA-8EAD-BC69FE8DE1D7}"/>
+              </a:ext>
+            </a:extLst>
+          </p:cNvPr>
+          <p:cNvSpPr>
+            <a:spLocks noGrp="1"/>
+          </p:cNvSpPr>
+          <p:nvPr>
+            <p:ph type="title"/>
+          </p:nvPr>
+        </p:nvSpPr>
+        <p:spPr/>
+        <p:txBody>
+          <a:bodyPr/>
+          <a:lstStyle/>
+          <a:p>
+            <a:r>
+              <a:rPr lang="en-US" dirty="0"/>
+              <a:t>Protecting yourself</a:t>
+            </a:r>
+          </a:p>
+        </p:txBody>
+      </p:sp>
+      <p:sp>
+        <p:nvSpPr>
+          <p:cNvPr id="3" name="Content Placeholder 2">
+            <a:extLst>
+              <a:ext uri="{FF2B5EF4-FFF2-40B4-BE49-F238E27FC236}">
+                <a16:creationId xmlns:a16="http://schemas.microsoft.com/office/drawing/2014/main" id="{4208B2B6-3584-41DD-9AFE-324955A50BA3}"/>
+              </a:ext>
+            </a:extLst>
+          </p:cNvPr>
+          <p:cNvSpPr>
+            <a:spLocks noGrp="1"/>
+          </p:cNvSpPr>
+          <p:nvPr>
+            <p:ph idx="1"/>
+          </p:nvPr>
+        </p:nvSpPr>
+        <p:spPr/>
+        <p:txBody>
+          <a:bodyPr>
+            <a:normAutofit/>
+          </a:bodyPr>
+          <a:lstStyle/>
+          <a:p>
+            <a:r>
+              <a:rPr lang="en-US" dirty="0">
+                <a:hlinkClick r:id="rId2"/>
+              </a:rPr>
+              <a:t>https://www.cnet.com/news/five-ways-to-protect-yourself-from-wi-fi-honeypots/#!</a:t>
+            </a:r>
+          </a:p>
+          <a:p>
+            <a:r>
+              <a:rPr lang="en-US" b="1" dirty="0"/>
+              <a:t>1. Turn off Wi-Fi capabilities when you’re not using them</a:t>
+            </a:r>
+            <a:endParaRPr lang="en-US" dirty="0"/>
+          </a:p>
+          <a:p>
+            <a:r>
+              <a:rPr lang="en-US" b="1" dirty="0"/>
+              <a:t>2. Avoid open Wi-Fi networks</a:t>
+            </a:r>
+          </a:p>
+          <a:p>
+            <a:pPr lvl="1"/>
+            <a:r>
+              <a:rPr lang="en-US" dirty="0"/>
+              <a:t>Anyone can connect to these networks. They are unmonitored and no one is watching. </a:t>
+            </a:r>
+          </a:p>
+          <a:p>
+            <a:r>
+              <a:rPr lang="en-US" b="1" dirty="0"/>
+              <a:t>3. Use a VPN</a:t>
+            </a:r>
+            <a:endParaRPr lang="en-US" dirty="0"/>
+          </a:p>
+          <a:p>
+            <a:r>
+              <a:rPr lang="en-US" b="1" dirty="0"/>
+              <a:t>4. Do not leave obsolete devices connected to networks</a:t>
+            </a:r>
+          </a:p>
+          <a:p>
+            <a:pPr lvl="1"/>
+            <a:r>
+              <a:rPr lang="en-US" dirty="0"/>
+              <a:t>The weakest link in a network is an entry point that can be exploited for easy access to other devices</a:t>
+            </a:r>
+          </a:p>
+          <a:p>
+            <a:r>
+              <a:rPr lang="en-US" b="1" dirty="0"/>
+              <a:t>5. Change your passwords often</a:t>
+            </a:r>
+          </a:p>
+          <a:p>
+            <a:pPr lvl="1"/>
+            <a:r>
+              <a:rPr lang="en-US" dirty="0"/>
+              <a:t>Keep 3-5 unique passwords or similar variants of 2-3 passwords</a:t>
+            </a:r>
+          </a:p>
+          <a:p>
+            <a:r>
+              <a:rPr lang="en-US" b="1" dirty="0"/>
+              <a:t>6. Don’t click on suspicious links</a:t>
+            </a:r>
+          </a:p>
+        </p:txBody>
+      </p:sp>
+    </p:spTree>
+    <p:extLst>
+      <p:ext uri="{BB962C8B-B14F-4D97-AF65-F5344CB8AC3E}">
+        <p14:creationId xmlns:p14="http://schemas.microsoft.com/office/powerpoint/2010/main" val="1435101913"/>
+      </p:ext>
+    </p:extLst>
+  </p:cSld>
+  <p:clrMapOvr>
+    <a:masterClrMapping/>
+  </p:clrMapOvr>
+</p:sld>
+</file>
+
+<file path=ppt/slides/slide13.xml><?xml version="1.0" encoding="utf-8"?>
+<p:sld xmlns:a="http://schemas.openxmlformats.org/drawingml/2006/main" xmlns:r="http://schemas.openxmlformats.org/officeDocument/2006/relationships" xmlns:p="http://schemas.openxmlformats.org/presentationml/2006/main">
+  <p:cSld>
+    <p:spTree>
+      <p:nvGrpSpPr>
+        <p:cNvPr id="1" name=""/>
+        <p:cNvGrpSpPr/>
+        <p:nvPr/>
+      </p:nvGrpSpPr>
+      <p:grpSpPr>
+        <a:xfrm>
+          <a:off x="0" y="0"/>
+          <a:ext cx="0" cy="0"/>
+          <a:chOff x="0" y="0"/>
+          <a:chExt cx="0" cy="0"/>
+        </a:xfrm>
+      </p:grpSpPr>
+      <p:sp>
+        <p:nvSpPr>
+          <p:cNvPr id="2" name="Title 1">
+            <a:extLst>
+              <a:ext uri="{FF2B5EF4-FFF2-40B4-BE49-F238E27FC236}">
+                <a16:creationId xmlns:a16="http://schemas.microsoft.com/office/drawing/2014/main" id="{BA87FAF2-CEAE-4253-BFA5-15A6826B2F26}"/>
+              </a:ext>
+            </a:extLst>
+          </p:cNvPr>
+          <p:cNvSpPr>
+            <a:spLocks noGrp="1"/>
+          </p:cNvSpPr>
+          <p:nvPr>
+            <p:ph type="title"/>
+          </p:nvPr>
+        </p:nvSpPr>
+        <p:spPr/>
+        <p:txBody>
+          <a:bodyPr/>
+          <a:lstStyle/>
+          <a:p>
+            <a:pPr algn="ctr"/>
+            <a:r>
+              <a:rPr lang="en-US" dirty="0"/>
+              <a:t>Tools and Technologies used </a:t>
+            </a:r>
+          </a:p>
+        </p:txBody>
+      </p:sp>
+      <p:sp>
+        <p:nvSpPr>
+          <p:cNvPr id="3" name="Content Placeholder 2">
+            <a:extLst>
+              <a:ext uri="{FF2B5EF4-FFF2-40B4-BE49-F238E27FC236}">
+                <a16:creationId xmlns:a16="http://schemas.microsoft.com/office/drawing/2014/main" id="{3C921350-040D-4C07-8812-7245D841B388}"/>
+              </a:ext>
+            </a:extLst>
+          </p:cNvPr>
+          <p:cNvSpPr>
+            <a:spLocks noGrp="1"/>
+          </p:cNvSpPr>
+          <p:nvPr>
+            <p:ph idx="1"/>
+          </p:nvPr>
+        </p:nvSpPr>
+        <p:spPr/>
+        <p:txBody>
+          <a:bodyPr/>
+          <a:lstStyle/>
+          <a:p>
+            <a:r>
+              <a:rPr lang="en-US" dirty="0"/>
+              <a:t>Creating and interacting with our backdoor payload</a:t>
+            </a:r>
+          </a:p>
+          <a:p>
+            <a:pPr lvl="1"/>
+            <a:r>
+              <a:rPr lang="en-US" dirty="0" err="1"/>
+              <a:t>Netcat</a:t>
+            </a:r>
+            <a:endParaRPr lang="en-US" dirty="0"/>
+          </a:p>
+          <a:p>
+            <a:pPr lvl="1"/>
+            <a:r>
+              <a:rPr lang="en-US" dirty="0"/>
+              <a:t>GNU Bash</a:t>
+            </a:r>
+          </a:p>
+          <a:p>
+            <a:r>
+              <a:rPr lang="en-US" dirty="0"/>
+              <a:t>Creating captive portals</a:t>
+            </a:r>
+          </a:p>
+          <a:p>
+            <a:pPr lvl="1"/>
+            <a:r>
+              <a:rPr lang="en-US" dirty="0"/>
+              <a:t>TCP/IP packets/connections</a:t>
+            </a:r>
+          </a:p>
+          <a:p>
+            <a:pPr lvl="1"/>
+            <a:r>
+              <a:rPr lang="en-US" dirty="0"/>
+              <a:t>JavaScript/HTML </a:t>
+            </a:r>
+          </a:p>
+          <a:p>
+            <a:r>
+              <a:rPr lang="en-US" dirty="0"/>
+              <a:t>Raspberry Pi 4</a:t>
+            </a:r>
+          </a:p>
+        </p:txBody>
+      </p:sp>
+    </p:spTree>
+    <p:extLst>
+      <p:ext uri="{BB962C8B-B14F-4D97-AF65-F5344CB8AC3E}">
+        <p14:creationId xmlns:p14="http://schemas.microsoft.com/office/powerpoint/2010/main" val="3540100852"/>
+      </p:ext>
+    </p:extLst>
+  </p:cSld>
+  <p:clrMapOvr>
+    <a:masterClrMapping/>
+  </p:clrMapOvr>
+</p:sld>
+</file>
+
 <file path=ppt/slides/slide2.xml><?xml version="1.0" encoding="utf-8"?>
 <p:sld xmlns:a="http://schemas.openxmlformats.org/drawingml/2006/main" xmlns:r="http://schemas.openxmlformats.org/officeDocument/2006/relationships" xmlns:p="http://schemas.openxmlformats.org/presentationml/2006/main">
   <p:cSld>
@@ -4359,7 +5111,7 @@
             <a:pPr algn="ctr"/>
             <a:r>
               <a:rPr lang="en-US" dirty="0"/>
-              <a:t>Topics of research</a:t>
+              <a:t>Topics that our project covers</a:t>
             </a:r>
           </a:p>
         </p:txBody>
@@ -4382,52 +5134,54 @@
         </p:nvSpPr>
         <p:spPr/>
         <p:txBody>
-          <a:bodyPr/>
+          <a:bodyPr>
+            <a:normAutofit lnSpcReduction="10000"/>
+          </a:bodyPr>
           <a:lstStyle/>
           <a:p>
             <a:r>
-              <a:rPr lang="en-US" dirty="0"/>
-              <a:t>In the group proposal, we suggested multiple vulnerabilities that we were interested in learning about. The main topics include: </a:t>
-            </a:r>
-          </a:p>
-          <a:p>
-            <a:r>
-              <a:rPr lang="en-US" b="1" dirty="0"/>
-              <a:t>Shellshock: </a:t>
-            </a:r>
-            <a:r>
-              <a:rPr lang="en-US" dirty="0"/>
-              <a:t>Although not in our original proposal, this was a vulnerability that we were able to recreate and would be able to use to create a reverse shell on our target’s computer. This vulnerability is unique to GNU bash and was present from V1.1 to V4.3. </a:t>
-            </a:r>
-          </a:p>
-          <a:p>
-            <a:r>
-              <a:rPr lang="en-US" b="1" dirty="0"/>
-              <a:t>Captive Portal: </a:t>
-            </a:r>
-            <a:r>
-              <a:rPr lang="en-US" dirty="0"/>
-              <a:t>In combination with packet sniffing</a:t>
-            </a:r>
-            <a:r>
-              <a:rPr lang="en-US" b="1" dirty="0"/>
-              <a:t>, </a:t>
-            </a:r>
-            <a:r>
-              <a:rPr lang="en-US" dirty="0"/>
-              <a:t>One common way to infect devices over a network is to direct users to a captive portal before letting them browse freely. Many people overlook these agreements or warnings and click away. We created a webpage to be able to download our payload onto a victim’s device. </a:t>
-            </a:r>
-            <a:endParaRPr lang="en-US" b="1" dirty="0"/>
-          </a:p>
-          <a:p>
-            <a:r>
-              <a:rPr lang="en-US" b="1" dirty="0"/>
-              <a:t>Packet Sniffing/Man-in-the-middle: </a:t>
-            </a:r>
-            <a:r>
-              <a:rPr lang="en-US" dirty="0"/>
-              <a:t>Using a raspberry pi, we are able to broadcast a wi-fi signal that other devices can connect to, allowing their traffic to travel through our raspberry pi before it finally goes off to it’s destination. </a:t>
-            </a:r>
+              <a:rPr lang="en-US" sz="1800" dirty="0"/>
+              <a:t>This project covers a few different vulnerabilities and combines them together to create a devastating access point onto any Linux computer with a Bash shell and crontab installed. </a:t>
+            </a:r>
+          </a:p>
+          <a:p>
+            <a:r>
+              <a:rPr lang="en-US" sz="1800" b="1" dirty="0"/>
+              <a:t>Shellshock/Backdoor: </a:t>
+            </a:r>
+            <a:r>
+              <a:rPr lang="en-US" sz="1800" dirty="0"/>
+              <a:t>Using a vulnerability in Bash shells from version 1.0.3 (Sept 1, 1989) to 4.3 (Sept 24, 2014) we are able to create a reverse shell on a victim’s machine without the user detecting any odd or suspicious behavior. We also use other Linux utilities like crontab to execute our payload every minute.</a:t>
+            </a:r>
+          </a:p>
+          <a:p>
+            <a:r>
+              <a:rPr lang="en-US" sz="1800" b="1" dirty="0"/>
+              <a:t>Captive Portal/</a:t>
+            </a:r>
+            <a:r>
+              <a:rPr lang="en-US" sz="1800" b="1" dirty="0" err="1"/>
+              <a:t>Deauth</a:t>
+            </a:r>
+            <a:r>
+              <a:rPr lang="en-US" sz="1800" b="1" dirty="0"/>
+              <a:t>: </a:t>
+            </a:r>
+            <a:r>
+              <a:rPr lang="en-US" sz="1800" dirty="0"/>
+              <a:t>In combination with Man-in-the-middle attacks like deauthorization, we are able to kick devices off a network and make them automatically connect back onto our network, where we redirect their traffic to our own webpage. Our webpage is how we install the payload onto the victim’s device using </a:t>
+            </a:r>
+            <a:r>
+              <a:rPr lang="en-US" sz="1800" dirty="0" err="1"/>
+              <a:t>javascript</a:t>
+            </a:r>
+            <a:r>
+              <a:rPr lang="en-US" sz="1800" dirty="0"/>
+              <a:t>.</a:t>
+            </a:r>
+            <a:endParaRPr lang="en-US" sz="1800" b="1" dirty="0"/>
+          </a:p>
+          <a:p>
             <a:endParaRPr lang="en-US" b="1" dirty="0"/>
           </a:p>
           <a:p>
@@ -4470,7 +5224,7 @@
           <p:cNvPr id="2" name="Title 1">
             <a:extLst>
               <a:ext uri="{FF2B5EF4-FFF2-40B4-BE49-F238E27FC236}">
-                <a16:creationId xmlns:a16="http://schemas.microsoft.com/office/drawing/2014/main" id="{123E8AAF-4E0B-4E49-9F1C-C55E0A8A56DC}"/>
+                <a16:creationId xmlns:a16="http://schemas.microsoft.com/office/drawing/2014/main" id="{EBBE7960-9AED-40EB-B442-A4F9A461AADB}"/>
               </a:ext>
             </a:extLst>
           </p:cNvPr>
@@ -4486,48 +5240,60 @@
           <a:bodyPr/>
           <a:lstStyle/>
           <a:p>
-            <a:pPr algn="ctr"/>
             <a:r>
               <a:rPr lang="en-US" dirty="0"/>
-              <a:t>Using shellshock to start a reverse shell</a:t>
-            </a:r>
-          </a:p>
-        </p:txBody>
-      </p:sp>
-      <p:pic>
-        <p:nvPicPr>
-          <p:cNvPr id="4" name="Picture 3">
+              <a:t>Captive Portal</a:t>
+            </a:r>
+          </a:p>
+        </p:txBody>
+      </p:sp>
+      <p:sp>
+        <p:nvSpPr>
+          <p:cNvPr id="3" name="Content Placeholder 2">
             <a:extLst>
               <a:ext uri="{FF2B5EF4-FFF2-40B4-BE49-F238E27FC236}">
-                <a16:creationId xmlns:a16="http://schemas.microsoft.com/office/drawing/2014/main" id="{1935A296-C8CD-4CF3-992B-B1452C02726E}"/>
+                <a16:creationId xmlns:a16="http://schemas.microsoft.com/office/drawing/2014/main" id="{16B78B45-1DCF-4DD1-BF96-C6823E6F47F2}"/>
               </a:ext>
             </a:extLst>
           </p:cNvPr>
-          <p:cNvPicPr>
-            <a:picLocks noChangeAspect="1"/>
-          </p:cNvPicPr>
-          <p:nvPr/>
-        </p:nvPicPr>
-        <p:blipFill>
-          <a:blip r:embed="rId2"/>
-          <a:stretch>
-            <a:fillRect/>
-          </a:stretch>
-        </p:blipFill>
-        <p:spPr>
-          <a:xfrm>
-            <a:off x="2120773" y="1928396"/>
-            <a:ext cx="7745899" cy="3913520"/>
-          </a:xfrm>
-          <a:prstGeom prst="rect">
-            <a:avLst/>
-          </a:prstGeom>
-        </p:spPr>
-      </p:pic>
+          <p:cNvSpPr>
+            <a:spLocks noGrp="1"/>
+          </p:cNvSpPr>
+          <p:nvPr>
+            <p:ph idx="1"/>
+          </p:nvPr>
+        </p:nvSpPr>
+        <p:spPr/>
+        <p:txBody>
+          <a:bodyPr/>
+          <a:lstStyle/>
+          <a:p>
+            <a:endParaRPr lang="en-US" dirty="0"/>
+          </a:p>
+          <a:p>
+            <a:r>
+              <a:rPr lang="en-US" dirty="0"/>
+              <a:t>Social engineering approach to infiltrating a device. Rely on the impatience and ignorance of users to click on untrusted links and buttons.</a:t>
+            </a:r>
+          </a:p>
+          <a:p>
+            <a:r>
+              <a:rPr lang="en-US" dirty="0"/>
+              <a:t>This approach is used in combination with attacks like a man-in-the-middle attack. When a device wants to reach an IP address like 192.168.0.1, the attacker can redirect traffic to their own locally hosted webpage instead. </a:t>
+            </a:r>
+          </a:p>
+          <a:p>
+            <a:r>
+              <a:rPr lang="en-US" dirty="0"/>
+              <a:t>This is an effective approach because if traffic is managed carefully enough, the victim will not even realize that their device has become compromised. If they try to use a login prompt and enter another webpage, the attacker can log their keystrokes, stealing their credentials, and still redirect them to their desired page with ease. </a:t>
+            </a:r>
+          </a:p>
+        </p:txBody>
+      </p:sp>
     </p:spTree>
     <p:extLst>
       <p:ext uri="{BB962C8B-B14F-4D97-AF65-F5344CB8AC3E}">
-        <p14:creationId xmlns:p14="http://schemas.microsoft.com/office/powerpoint/2010/main" val="2303407940"/>
+        <p14:creationId xmlns:p14="http://schemas.microsoft.com/office/powerpoint/2010/main" val="2154849307"/>
       </p:ext>
     </p:extLst>
   </p:cSld>
@@ -4559,7 +5325,7 @@
           <p:cNvPr id="2" name="Title 1">
             <a:extLst>
               <a:ext uri="{FF2B5EF4-FFF2-40B4-BE49-F238E27FC236}">
-                <a16:creationId xmlns:a16="http://schemas.microsoft.com/office/drawing/2014/main" id="{1E6B5280-EAE4-4C46-B558-2BDAFE74E44B}"/>
+                <a16:creationId xmlns:a16="http://schemas.microsoft.com/office/drawing/2014/main" id="{123E8AAF-4E0B-4E49-9F1C-C55E0A8A56DC}"/>
               </a:ext>
             </a:extLst>
           </p:cNvPr>
@@ -4570,7 +5336,12 @@
             <p:ph type="title"/>
           </p:nvPr>
         </p:nvSpPr>
-        <p:spPr/>
+        <p:spPr>
+          <a:xfrm>
+            <a:off x="1066800" y="27038"/>
+            <a:ext cx="10058400" cy="1371600"/>
+          </a:xfrm>
+        </p:spPr>
         <p:txBody>
           <a:bodyPr/>
           <a:lstStyle/>
@@ -4578,341 +5349,62 @@
             <a:pPr algn="ctr"/>
             <a:r>
               <a:rPr lang="en-US" dirty="0"/>
-              <a:t>A little explanation</a:t>
+              <a:t>Captive Portal Example</a:t>
             </a:r>
           </a:p>
         </p:txBody>
       </p:sp>
       <p:pic>
         <p:nvPicPr>
-          <p:cNvPr id="4" name="Content Placeholder 3">
+          <p:cNvPr id="1028" name="Picture 4">
             <a:extLst>
               <a:ext uri="{FF2B5EF4-FFF2-40B4-BE49-F238E27FC236}">
-                <a16:creationId xmlns:a16="http://schemas.microsoft.com/office/drawing/2014/main" id="{3E70FE87-B349-45FB-BFF1-82A7B180162A}"/>
+                <a16:creationId xmlns:a16="http://schemas.microsoft.com/office/drawing/2014/main" id="{E7C6D662-8306-4F53-AF55-542AE3185B77}"/>
               </a:ext>
             </a:extLst>
           </p:cNvPr>
           <p:cNvPicPr>
-            <a:picLocks noGrp="1" noChangeAspect="1"/>
+            <a:picLocks noChangeAspect="1" noChangeArrowheads="1"/>
           </p:cNvPicPr>
-          <p:nvPr>
-            <p:ph idx="1"/>
-          </p:nvPr>
+          <p:nvPr/>
         </p:nvPicPr>
         <p:blipFill>
-          <a:blip r:embed="rId2"/>
+          <a:blip r:embed="rId2">
+            <a:extLst>
+              <a:ext uri="{28A0092B-C50C-407E-A947-70E740481C1C}">
+                <a14:useLocalDpi xmlns:a14="http://schemas.microsoft.com/office/drawing/2010/main" val="0"/>
+              </a:ext>
+            </a:extLst>
+          </a:blip>
+          <a:srcRect/>
           <a:stretch>
             <a:fillRect/>
           </a:stretch>
         </p:blipFill>
-        <p:spPr>
-          <a:xfrm>
-            <a:off x="2191364" y="1836448"/>
-            <a:ext cx="2576052" cy="760617"/>
-          </a:xfrm>
-          <a:prstGeom prst="rect">
-            <a:avLst/>
-          </a:prstGeom>
-        </p:spPr>
-      </p:pic>
-      <p:sp>
-        <p:nvSpPr>
-          <p:cNvPr id="5" name="TextBox 4">
-            <a:extLst>
-              <a:ext uri="{FF2B5EF4-FFF2-40B4-BE49-F238E27FC236}">
-                <a16:creationId xmlns:a16="http://schemas.microsoft.com/office/drawing/2014/main" id="{16D49123-56B3-4F38-90F3-94DBA282165C}"/>
-              </a:ext>
-            </a:extLst>
-          </p:cNvPr>
-          <p:cNvSpPr txBox="1"/>
-          <p:nvPr/>
-        </p:nvSpPr>
-        <p:spPr>
-          <a:xfrm>
-            <a:off x="6786717" y="1859665"/>
-            <a:ext cx="3347884" cy="646331"/>
+        <p:spPr bwMode="auto">
+          <a:xfrm>
+            <a:off x="1172496" y="712838"/>
+            <a:ext cx="9847008" cy="6312185"/>
           </a:xfrm>
           <a:prstGeom prst="rect">
             <a:avLst/>
           </a:prstGeom>
           <a:noFill/>
-        </p:spPr>
-        <p:txBody>
-          <a:bodyPr wrap="square" rtlCol="0">
-            <a:spAutoFit/>
-          </a:bodyPr>
-          <a:lstStyle/>
-          <a:p>
-            <a:r>
-              <a:rPr lang="en-US" dirty="0"/>
-              <a:t>Create a hidden directory and change the </a:t>
-            </a:r>
-            <a:r>
-              <a:rPr lang="en-US" dirty="0" err="1"/>
-              <a:t>cwd</a:t>
-            </a:r>
-            <a:r>
-              <a:rPr lang="en-US" dirty="0"/>
-              <a:t> there</a:t>
-            </a:r>
-          </a:p>
-        </p:txBody>
-      </p:sp>
-      <p:pic>
-        <p:nvPicPr>
-          <p:cNvPr id="6" name="Picture 5">
-            <a:extLst>
-              <a:ext uri="{FF2B5EF4-FFF2-40B4-BE49-F238E27FC236}">
-                <a16:creationId xmlns:a16="http://schemas.microsoft.com/office/drawing/2014/main" id="{636AE451-C56F-4BA9-8977-02A9CC316882}"/>
-              </a:ext>
-            </a:extLst>
-          </p:cNvPr>
-          <p:cNvPicPr>
-            <a:picLocks noChangeAspect="1"/>
-          </p:cNvPicPr>
-          <p:nvPr/>
-        </p:nvPicPr>
-        <p:blipFill>
-          <a:blip r:embed="rId3"/>
-          <a:stretch>
-            <a:fillRect/>
-          </a:stretch>
-        </p:blipFill>
-        <p:spPr>
-          <a:xfrm>
-            <a:off x="395748" y="2928495"/>
-            <a:ext cx="6440129" cy="803314"/>
-          </a:xfrm>
-          <a:prstGeom prst="rect">
-            <a:avLst/>
-          </a:prstGeom>
+          <a:extLst>
+            <a:ext uri="{909E8E84-426E-40DD-AFC4-6F175D3DCCD1}">
+              <a14:hiddenFill xmlns:a14="http://schemas.microsoft.com/office/drawing/2010/main">
+                <a:solidFill>
+                  <a:srgbClr val="FFFFFF"/>
+                </a:solidFill>
+              </a14:hiddenFill>
+            </a:ext>
+          </a:extLst>
         </p:spPr>
       </p:pic>
-      <p:sp>
-        <p:nvSpPr>
-          <p:cNvPr id="7" name="TextBox 6">
-            <a:extLst>
-              <a:ext uri="{FF2B5EF4-FFF2-40B4-BE49-F238E27FC236}">
-                <a16:creationId xmlns:a16="http://schemas.microsoft.com/office/drawing/2014/main" id="{ABFC75A5-7834-4764-A363-A7E7412211FF}"/>
-              </a:ext>
-            </a:extLst>
-          </p:cNvPr>
-          <p:cNvSpPr txBox="1"/>
-          <p:nvPr/>
-        </p:nvSpPr>
-        <p:spPr>
-          <a:xfrm>
-            <a:off x="7975191" y="2828835"/>
-            <a:ext cx="3821061" cy="1200329"/>
-          </a:xfrm>
-          <a:prstGeom prst="rect">
-            <a:avLst/>
-          </a:prstGeom>
-          <a:noFill/>
-        </p:spPr>
-        <p:txBody>
-          <a:bodyPr wrap="square" rtlCol="0">
-            <a:spAutoFit/>
-          </a:bodyPr>
-          <a:lstStyle/>
-          <a:p>
-            <a:r>
-              <a:rPr lang="en-US" dirty="0"/>
-              <a:t>Create the payload file </a:t>
-            </a:r>
-            <a:r>
-              <a:rPr lang="en-US" dirty="0" err="1"/>
-              <a:t>shell.cgi</a:t>
-            </a:r>
-            <a:r>
-              <a:rPr lang="en-US" dirty="0"/>
-              <a:t>. Echo the payload and redirect the output to </a:t>
-            </a:r>
-            <a:r>
-              <a:rPr lang="en-US" dirty="0" err="1"/>
-              <a:t>shell.cgi</a:t>
-            </a:r>
-            <a:r>
-              <a:rPr lang="en-US" dirty="0"/>
-              <a:t>. Give it all permissions. </a:t>
-            </a:r>
-          </a:p>
-        </p:txBody>
-      </p:sp>
-      <p:pic>
-        <p:nvPicPr>
-          <p:cNvPr id="8" name="Picture 7">
-            <a:extLst>
-              <a:ext uri="{FF2B5EF4-FFF2-40B4-BE49-F238E27FC236}">
-                <a16:creationId xmlns:a16="http://schemas.microsoft.com/office/drawing/2014/main" id="{639C5112-D1BD-47C4-822D-97F5BCF5A4F4}"/>
-              </a:ext>
-            </a:extLst>
-          </p:cNvPr>
-          <p:cNvPicPr>
-            <a:picLocks noChangeAspect="1"/>
-          </p:cNvPicPr>
-          <p:nvPr/>
-        </p:nvPicPr>
-        <p:blipFill>
-          <a:blip r:embed="rId4"/>
-          <a:stretch>
-            <a:fillRect/>
-          </a:stretch>
-        </p:blipFill>
-        <p:spPr>
-          <a:xfrm>
-            <a:off x="775519" y="4488122"/>
-            <a:ext cx="5680585" cy="1330588"/>
-          </a:xfrm>
-          <a:prstGeom prst="rect">
-            <a:avLst/>
-          </a:prstGeom>
-        </p:spPr>
-      </p:pic>
-      <p:sp>
-        <p:nvSpPr>
-          <p:cNvPr id="9" name="TextBox 8">
-            <a:extLst>
-              <a:ext uri="{FF2B5EF4-FFF2-40B4-BE49-F238E27FC236}">
-                <a16:creationId xmlns:a16="http://schemas.microsoft.com/office/drawing/2014/main" id="{58F99AB4-0D82-4291-84A0-00D58871FC35}"/>
-              </a:ext>
-            </a:extLst>
-          </p:cNvPr>
-          <p:cNvSpPr txBox="1"/>
-          <p:nvPr/>
-        </p:nvSpPr>
-        <p:spPr>
-          <a:xfrm>
-            <a:off x="5891980" y="1978788"/>
-            <a:ext cx="943897" cy="369332"/>
-          </a:xfrm>
-          <a:prstGeom prst="rect">
-            <a:avLst/>
-          </a:prstGeom>
-          <a:noFill/>
-        </p:spPr>
-        <p:txBody>
-          <a:bodyPr wrap="square" rtlCol="0">
-            <a:spAutoFit/>
-          </a:bodyPr>
-          <a:lstStyle/>
-          <a:p>
-            <a:r>
-              <a:rPr lang="en-US" b="1" dirty="0"/>
-              <a:t>Step 1:</a:t>
-            </a:r>
-          </a:p>
-        </p:txBody>
-      </p:sp>
-      <p:sp>
-        <p:nvSpPr>
-          <p:cNvPr id="10" name="TextBox 9">
-            <a:extLst>
-              <a:ext uri="{FF2B5EF4-FFF2-40B4-BE49-F238E27FC236}">
-                <a16:creationId xmlns:a16="http://schemas.microsoft.com/office/drawing/2014/main" id="{173AC370-F037-4030-B729-6D33DD17BB8B}"/>
-              </a:ext>
-            </a:extLst>
-          </p:cNvPr>
-          <p:cNvSpPr txBox="1"/>
-          <p:nvPr/>
-        </p:nvSpPr>
-        <p:spPr>
-          <a:xfrm>
-            <a:off x="7123471" y="3145486"/>
-            <a:ext cx="943897" cy="369332"/>
-          </a:xfrm>
-          <a:prstGeom prst="rect">
-            <a:avLst/>
-          </a:prstGeom>
-          <a:noFill/>
-        </p:spPr>
-        <p:txBody>
-          <a:bodyPr wrap="square" rtlCol="0">
-            <a:spAutoFit/>
-          </a:bodyPr>
-          <a:lstStyle/>
-          <a:p>
-            <a:r>
-              <a:rPr lang="en-US" b="1" dirty="0"/>
-              <a:t>Step 2:</a:t>
-            </a:r>
-          </a:p>
-        </p:txBody>
-      </p:sp>
-      <p:sp>
-        <p:nvSpPr>
-          <p:cNvPr id="12" name="TextBox 11">
-            <a:extLst>
-              <a:ext uri="{FF2B5EF4-FFF2-40B4-BE49-F238E27FC236}">
-                <a16:creationId xmlns:a16="http://schemas.microsoft.com/office/drawing/2014/main" id="{71D17B9F-6B37-457E-868E-0A881C5A1DF3}"/>
-              </a:ext>
-            </a:extLst>
-          </p:cNvPr>
-          <p:cNvSpPr txBox="1"/>
-          <p:nvPr/>
-        </p:nvSpPr>
-        <p:spPr>
-          <a:xfrm>
-            <a:off x="7097662" y="4968750"/>
-            <a:ext cx="943897" cy="369332"/>
-          </a:xfrm>
-          <a:prstGeom prst="rect">
-            <a:avLst/>
-          </a:prstGeom>
-          <a:noFill/>
-        </p:spPr>
-        <p:txBody>
-          <a:bodyPr wrap="square" rtlCol="0">
-            <a:spAutoFit/>
-          </a:bodyPr>
-          <a:lstStyle/>
-          <a:p>
-            <a:r>
-              <a:rPr lang="en-US" b="1" dirty="0"/>
-              <a:t>Step 3:</a:t>
-            </a:r>
-          </a:p>
-        </p:txBody>
-      </p:sp>
-      <p:sp>
-        <p:nvSpPr>
-          <p:cNvPr id="13" name="TextBox 12">
-            <a:extLst>
-              <a:ext uri="{FF2B5EF4-FFF2-40B4-BE49-F238E27FC236}">
-                <a16:creationId xmlns:a16="http://schemas.microsoft.com/office/drawing/2014/main" id="{5D0AF8AC-9703-4E84-B5DD-167B64D94B07}"/>
-              </a:ext>
-            </a:extLst>
-          </p:cNvPr>
-          <p:cNvSpPr txBox="1"/>
-          <p:nvPr/>
-        </p:nvSpPr>
-        <p:spPr>
-          <a:xfrm>
-            <a:off x="7898991" y="4390850"/>
-            <a:ext cx="3821061" cy="1754326"/>
-          </a:xfrm>
-          <a:prstGeom prst="rect">
-            <a:avLst/>
-          </a:prstGeom>
-          <a:noFill/>
-        </p:spPr>
-        <p:txBody>
-          <a:bodyPr wrap="square" rtlCol="0">
-            <a:spAutoFit/>
-          </a:bodyPr>
-          <a:lstStyle/>
-          <a:p>
-            <a:r>
-              <a:rPr lang="en-US" dirty="0"/>
-              <a:t>Create a file and store crontab syntax there to execute the payload every minute. Then execute crontab with that file as input. rm the file when you’re done with it</a:t>
-            </a:r>
-          </a:p>
-        </p:txBody>
-      </p:sp>
     </p:spTree>
     <p:extLst>
       <p:ext uri="{BB962C8B-B14F-4D97-AF65-F5344CB8AC3E}">
-        <p14:creationId xmlns:p14="http://schemas.microsoft.com/office/powerpoint/2010/main" val="1569030625"/>
+        <p14:creationId xmlns:p14="http://schemas.microsoft.com/office/powerpoint/2010/main" val="2303407940"/>
       </p:ext>
     </p:extLst>
   </p:cSld>
@@ -4944,7 +5436,7 @@
           <p:cNvPr id="2" name="Title 1">
             <a:extLst>
               <a:ext uri="{FF2B5EF4-FFF2-40B4-BE49-F238E27FC236}">
-                <a16:creationId xmlns:a16="http://schemas.microsoft.com/office/drawing/2014/main" id="{EBBE7960-9AED-40EB-B442-A4F9A461AADB}"/>
+                <a16:creationId xmlns:a16="http://schemas.microsoft.com/office/drawing/2014/main" id="{DBE7003E-79AD-488E-ABDE-E85F5BA9A2E6}"/>
               </a:ext>
             </a:extLst>
           </p:cNvPr>
@@ -4962,7 +5454,7 @@
           <a:p>
             <a:r>
               <a:rPr lang="en-US" dirty="0"/>
-              <a:t>Captive Portal</a:t>
+              <a:t>Setting up a captive portal is a chore</a:t>
             </a:r>
           </a:p>
         </p:txBody>
@@ -4972,7 +5464,7 @@
           <p:cNvPr id="3" name="Content Placeholder 2">
             <a:extLst>
               <a:ext uri="{FF2B5EF4-FFF2-40B4-BE49-F238E27FC236}">
-                <a16:creationId xmlns:a16="http://schemas.microsoft.com/office/drawing/2014/main" id="{16B78B45-1DCF-4DD1-BF96-C6823E6F47F2}"/>
+                <a16:creationId xmlns:a16="http://schemas.microsoft.com/office/drawing/2014/main" id="{C7A17EDB-CBCD-42C5-8363-7333FB9B3B46}"/>
               </a:ext>
             </a:extLst>
           </p:cNvPr>
@@ -4988,24 +5480,97 @@
           <a:bodyPr/>
           <a:lstStyle/>
           <a:p>
-            <a:endParaRPr lang="en-US" dirty="0"/>
-          </a:p>
-          <a:p>
             <a:r>
               <a:rPr lang="en-US" dirty="0"/>
-              <a:t>Social engineering approach to infiltrating a device. Rely on the impatience and ignorance of users to click on untrusted links and buttons.</a:t>
-            </a:r>
-          </a:p>
-          <a:p>
+              <a:t>The steps are split up into 6 different shell scripts, each performing a crucial task</a:t>
+            </a:r>
+          </a:p>
+          <a:p>
+            <a:pPr lvl="1"/>
+            <a:r>
+              <a:rPr lang="en-US" b="1" dirty="0"/>
+              <a:t>setup.sh </a:t>
+            </a:r>
             <a:r>
               <a:rPr lang="en-US" dirty="0"/>
-              <a:t>This approach is used in combination with attacks like a man-in-the-middle attack. When a device wants to reach an IP address like 192.168.0.1, the attacker can redirect traffic to their own locally hosted webpage instead. </a:t>
-            </a:r>
-          </a:p>
-          <a:p>
+              <a:t>– Only needs to be executed the first time. Essentially works like a dependency manager, makes sure all the right software is downloaded on the attacker’s computer.</a:t>
+            </a:r>
+          </a:p>
+          <a:p>
+            <a:pPr lvl="1"/>
+            <a:r>
+              <a:rPr lang="en-US" b="1" dirty="0"/>
+              <a:t>launch-ap.sh </a:t>
+            </a:r>
             <a:r>
               <a:rPr lang="en-US" dirty="0"/>
-              <a:t>This is an effective approach because if traffic is managed carefully enough, the victim will not even realize that their device has become compromised. If they try to use a login prompt and enter another webpage, the attacker can log their keystrokes, stealing their credentials, and still redirect them to their desired page with ease. </a:t>
+              <a:t>– Use a wireless LAN adapter as an access point that can transmit </a:t>
+            </a:r>
+            <a:r>
+              <a:rPr lang="en-US" dirty="0" err="1"/>
+              <a:t>wifi</a:t>
+            </a:r>
+            <a:r>
+              <a:rPr lang="en-US" dirty="0"/>
+              <a:t>.</a:t>
+            </a:r>
+          </a:p>
+          <a:p>
+            <a:pPr lvl="1"/>
+            <a:r>
+              <a:rPr lang="en-US" b="1" dirty="0"/>
+              <a:t>bridge.sh </a:t>
+            </a:r>
+            <a:r>
+              <a:rPr lang="en-US" dirty="0"/>
+              <a:t>– bridges our evil twin to another network with internet access.</a:t>
+            </a:r>
+          </a:p>
+          <a:p>
+            <a:pPr lvl="1"/>
+            <a:r>
+              <a:rPr lang="en-US" b="1" dirty="0"/>
+              <a:t>startserver.sh</a:t>
+            </a:r>
+            <a:r>
+              <a:rPr lang="en-US" dirty="0"/>
+              <a:t> – Start an Apache server that hosts the Captive Portal webpage</a:t>
+            </a:r>
+          </a:p>
+          <a:p>
+            <a:pPr lvl="1"/>
+            <a:r>
+              <a:rPr lang="en-US" b="1" dirty="0"/>
+              <a:t>spoof.sh</a:t>
+            </a:r>
+            <a:r>
+              <a:rPr lang="en-US" dirty="0"/>
+              <a:t> – sets up and runs a program to begin DNS spoofing on our network.</a:t>
+            </a:r>
+          </a:p>
+          <a:p>
+            <a:pPr lvl="1"/>
+            <a:r>
+              <a:rPr lang="en-US" b="1" dirty="0"/>
+              <a:t>deauth.sh </a:t>
+            </a:r>
+            <a:r>
+              <a:rPr lang="en-US" dirty="0"/>
+              <a:t>- </a:t>
+            </a:r>
+            <a:r>
+              <a:rPr lang="en-US" b="1" dirty="0"/>
+              <a:t> </a:t>
+            </a:r>
+            <a:r>
+              <a:rPr lang="en-US" dirty="0"/>
+              <a:t>performs a deauthorization attack on the access point specified by the MAC address given to BSSID</a:t>
+            </a:r>
+          </a:p>
+          <a:p>
+            <a:r>
+              <a:rPr lang="en-US" dirty="0"/>
+              <a:t>These scripts can be combined together into a single script, either by copy + pasting or a script that executes each smaller script sequentially, along with a few parameters like the name of the network you want to spoof, or what webpage you would like to use (if you have other versions of a captive portal).</a:t>
             </a:r>
           </a:p>
         </p:txBody>
@@ -5013,7 +5578,7 @@
     </p:spTree>
     <p:extLst>
       <p:ext uri="{BB962C8B-B14F-4D97-AF65-F5344CB8AC3E}">
-        <p14:creationId xmlns:p14="http://schemas.microsoft.com/office/powerpoint/2010/main" val="2154849307"/>
+        <p14:creationId xmlns:p14="http://schemas.microsoft.com/office/powerpoint/2010/main" val="3658132170"/>
       </p:ext>
     </p:extLst>
   </p:cSld>
@@ -5045,7 +5610,7 @@
           <p:cNvPr id="2" name="Title 1">
             <a:extLst>
               <a:ext uri="{FF2B5EF4-FFF2-40B4-BE49-F238E27FC236}">
-                <a16:creationId xmlns:a16="http://schemas.microsoft.com/office/drawing/2014/main" id="{13620802-9CA9-4ECB-BCE4-7451408E1116}"/>
+                <a16:creationId xmlns:a16="http://schemas.microsoft.com/office/drawing/2014/main" id="{43802F02-7C00-4291-8822-0DF08700EFA5}"/>
               </a:ext>
             </a:extLst>
           </p:cNvPr>
@@ -5061,10 +5626,7 @@
           <a:bodyPr/>
           <a:lstStyle/>
           <a:p>
-            <a:r>
-              <a:rPr lang="en-US" dirty="0"/>
-              <a:t>Example</a:t>
-            </a:r>
+            <a:endParaRPr lang="en-US" dirty="0"/>
           </a:p>
         </p:txBody>
       </p:sp>
@@ -5073,7 +5635,7 @@
           <p:cNvPr id="3" name="Content Placeholder 2">
             <a:extLst>
               <a:ext uri="{FF2B5EF4-FFF2-40B4-BE49-F238E27FC236}">
-                <a16:creationId xmlns:a16="http://schemas.microsoft.com/office/drawing/2014/main" id="{8734DB5B-4209-4B45-9409-7A18D3896176}"/>
+                <a16:creationId xmlns:a16="http://schemas.microsoft.com/office/drawing/2014/main" id="{2DD37E53-ED30-47AE-8141-AADD68C49580}"/>
               </a:ext>
             </a:extLst>
           </p:cNvPr>
@@ -5084,80 +5646,157 @@
             <p:ph idx="1"/>
           </p:nvPr>
         </p:nvSpPr>
-        <p:spPr>
-          <a:xfrm>
-            <a:off x="1066800" y="2103120"/>
-            <a:ext cx="4043516" cy="3849624"/>
-          </a:xfrm>
-        </p:spPr>
+        <p:spPr/>
         <p:txBody>
           <a:bodyPr/>
           <a:lstStyle/>
           <a:p>
-            <a:r>
-              <a:rPr lang="en-US" dirty="0"/>
-              <a:t>Many attackers impersonate real companies and corporations. </a:t>
-            </a:r>
-          </a:p>
-          <a:p>
-            <a:r>
-              <a:rPr lang="en-US" dirty="0"/>
-              <a:t>The kind of information that attackers are looking for are credit card numbers, email addresses, login credentials, social security numbers, phone numbers, home addresses, birthdays, or other identifying information that could be abused. </a:t>
-            </a:r>
+            <a:endParaRPr lang="en-US" dirty="0"/>
           </a:p>
         </p:txBody>
       </p:sp>
       <p:pic>
         <p:nvPicPr>
-          <p:cNvPr id="1026" name="Picture 2" descr="How to Work Around Wi-Fi Hotspot Captive Portals on Browserless ...">
+          <p:cNvPr id="4" name="Picture 3">
             <a:extLst>
               <a:ext uri="{FF2B5EF4-FFF2-40B4-BE49-F238E27FC236}">
-                <a16:creationId xmlns:a16="http://schemas.microsoft.com/office/drawing/2014/main" id="{DC850B6D-C36C-4CDF-880D-257D16000998}"/>
+                <a16:creationId xmlns:a16="http://schemas.microsoft.com/office/drawing/2014/main" id="{5B493220-D61C-4F98-BDE5-D178E09452B7}"/>
               </a:ext>
             </a:extLst>
           </p:cNvPr>
           <p:cNvPicPr>
-            <a:picLocks noChangeAspect="1" noChangeArrowheads="1"/>
+            <a:picLocks noChangeAspect="1"/>
           </p:cNvPicPr>
           <p:nvPr/>
         </p:nvPicPr>
         <p:blipFill>
-          <a:blip r:embed="rId2">
-            <a:extLst>
-              <a:ext uri="{28A0092B-C50C-407E-A947-70E740481C1C}">
-                <a14:useLocalDpi xmlns:a14="http://schemas.microsoft.com/office/drawing/2010/main" val="0"/>
-              </a:ext>
-            </a:extLst>
-          </a:blip>
-          <a:srcRect/>
+          <a:blip r:embed="rId2"/>
           <a:stretch>
             <a:fillRect/>
           </a:stretch>
         </p:blipFill>
-        <p:spPr bwMode="auto">
-          <a:xfrm>
-            <a:off x="5178762" y="2191238"/>
-            <a:ext cx="5779805" cy="3673387"/>
+        <p:spPr>
+          <a:xfrm>
+            <a:off x="81116" y="352922"/>
+            <a:ext cx="6282620" cy="5862484"/>
+          </a:xfrm>
+          <a:prstGeom prst="rect">
+            <a:avLst/>
+          </a:prstGeom>
+        </p:spPr>
+      </p:pic>
+      <p:pic>
+        <p:nvPicPr>
+          <p:cNvPr id="5" name="Picture 4">
+            <a:extLst>
+              <a:ext uri="{FF2B5EF4-FFF2-40B4-BE49-F238E27FC236}">
+                <a16:creationId xmlns:a16="http://schemas.microsoft.com/office/drawing/2014/main" id="{BCE1E02B-EEB4-4056-B978-A724E6128F68}"/>
+              </a:ext>
+            </a:extLst>
+          </p:cNvPr>
+          <p:cNvPicPr>
+            <a:picLocks noChangeAspect="1"/>
+          </p:cNvPicPr>
+          <p:nvPr/>
+        </p:nvPicPr>
+        <p:blipFill>
+          <a:blip r:embed="rId3"/>
+          <a:stretch>
+            <a:fillRect/>
+          </a:stretch>
+        </p:blipFill>
+        <p:spPr>
+          <a:xfrm>
+            <a:off x="6502554" y="1479292"/>
+            <a:ext cx="5565826" cy="3023848"/>
+          </a:xfrm>
+          <a:prstGeom prst="rect">
+            <a:avLst/>
+          </a:prstGeom>
+        </p:spPr>
+      </p:pic>
+      <p:sp>
+        <p:nvSpPr>
+          <p:cNvPr id="6" name="TextBox 5">
+            <a:extLst>
+              <a:ext uri="{FF2B5EF4-FFF2-40B4-BE49-F238E27FC236}">
+                <a16:creationId xmlns:a16="http://schemas.microsoft.com/office/drawing/2014/main" id="{DD8907F2-A4B3-49D5-9C4A-8861F4D7B30F}"/>
+              </a:ext>
+            </a:extLst>
+          </p:cNvPr>
+          <p:cNvSpPr txBox="1"/>
+          <p:nvPr/>
+        </p:nvSpPr>
+        <p:spPr>
+          <a:xfrm>
+            <a:off x="9947841" y="1479181"/>
+            <a:ext cx="3023419" cy="461665"/>
           </a:xfrm>
           <a:prstGeom prst="rect">
             <a:avLst/>
           </a:prstGeom>
           <a:noFill/>
-          <a:extLst>
-            <a:ext uri="{909E8E84-426E-40DD-AFC4-6F175D3DCCD1}">
-              <a14:hiddenFill xmlns:a14="http://schemas.microsoft.com/office/drawing/2010/main">
+        </p:spPr>
+        <p:txBody>
+          <a:bodyPr wrap="square" rtlCol="0">
+            <a:spAutoFit/>
+          </a:bodyPr>
+          <a:lstStyle/>
+          <a:p>
+            <a:r>
+              <a:rPr lang="en-US" sz="2400" b="1" dirty="0">
                 <a:solidFill>
-                  <a:srgbClr val="FFFFFF"/>
+                  <a:srgbClr val="FF0000"/>
                 </a:solidFill>
-              </a14:hiddenFill>
-            </a:ext>
-          </a:extLst>
-        </p:spPr>
-      </p:pic>
+              </a:rPr>
+              <a:t>launch-ap.sh</a:t>
+            </a:r>
+          </a:p>
+        </p:txBody>
+      </p:sp>
+      <p:sp>
+        <p:nvSpPr>
+          <p:cNvPr id="7" name="TextBox 6">
+            <a:extLst>
+              <a:ext uri="{FF2B5EF4-FFF2-40B4-BE49-F238E27FC236}">
+                <a16:creationId xmlns:a16="http://schemas.microsoft.com/office/drawing/2014/main" id="{E645C02C-344A-4050-8C99-554E42598424}"/>
+              </a:ext>
+            </a:extLst>
+          </p:cNvPr>
+          <p:cNvSpPr txBox="1"/>
+          <p:nvPr/>
+        </p:nvSpPr>
+        <p:spPr>
+          <a:xfrm>
+            <a:off x="4933335" y="362273"/>
+            <a:ext cx="3023419" cy="461665"/>
+          </a:xfrm>
+          <a:prstGeom prst="rect">
+            <a:avLst/>
+          </a:prstGeom>
+          <a:noFill/>
+        </p:spPr>
+        <p:txBody>
+          <a:bodyPr wrap="square" rtlCol="0">
+            <a:spAutoFit/>
+          </a:bodyPr>
+          <a:lstStyle/>
+          <a:p>
+            <a:r>
+              <a:rPr lang="en-US" sz="2400" b="1" dirty="0">
+                <a:solidFill>
+                  <a:srgbClr val="FF0000"/>
+                </a:solidFill>
+              </a:rPr>
+              <a:t>setup.sh</a:t>
+            </a:r>
+          </a:p>
+        </p:txBody>
+      </p:sp>
     </p:spTree>
     <p:extLst>
       <p:ext uri="{BB962C8B-B14F-4D97-AF65-F5344CB8AC3E}">
-        <p14:creationId xmlns:p14="http://schemas.microsoft.com/office/powerpoint/2010/main" val="3156803098"/>
+        <p14:creationId xmlns:p14="http://schemas.microsoft.com/office/powerpoint/2010/main" val="515825732"/>
       </p:ext>
     </p:extLst>
   </p:cSld>
@@ -5189,7 +5828,7 @@
           <p:cNvPr id="2" name="Title 1">
             <a:extLst>
               <a:ext uri="{FF2B5EF4-FFF2-40B4-BE49-F238E27FC236}">
-                <a16:creationId xmlns:a16="http://schemas.microsoft.com/office/drawing/2014/main" id="{6ECE95BE-A37B-4AEA-8EAD-BC69FE8DE1D7}"/>
+                <a16:creationId xmlns:a16="http://schemas.microsoft.com/office/drawing/2014/main" id="{A32FF881-F18B-48E0-BD85-1E7019161937}"/>
               </a:ext>
             </a:extLst>
           </p:cNvPr>
@@ -5205,10 +5844,7 @@
           <a:bodyPr/>
           <a:lstStyle/>
           <a:p>
-            <a:r>
-              <a:rPr lang="en-US" dirty="0"/>
-              <a:t>Protecting yourself</a:t>
-            </a:r>
+            <a:endParaRPr lang="en-US"/>
           </a:p>
         </p:txBody>
       </p:sp>
@@ -5217,7 +5853,7 @@
           <p:cNvPr id="3" name="Content Placeholder 2">
             <a:extLst>
               <a:ext uri="{FF2B5EF4-FFF2-40B4-BE49-F238E27FC236}">
-                <a16:creationId xmlns:a16="http://schemas.microsoft.com/office/drawing/2014/main" id="{4208B2B6-3584-41DD-9AFE-324955A50BA3}"/>
+                <a16:creationId xmlns:a16="http://schemas.microsoft.com/office/drawing/2014/main" id="{3C5719E1-BFC4-4E37-BCC7-5D9C9C340E0A}"/>
               </a:ext>
             </a:extLst>
           </p:cNvPr>
@@ -5230,75 +5866,147 @@
         </p:nvSpPr>
         <p:spPr/>
         <p:txBody>
-          <a:bodyPr>
-            <a:normAutofit/>
+          <a:bodyPr/>
+          <a:lstStyle/>
+          <a:p>
+            <a:endParaRPr lang="en-US" dirty="0"/>
+          </a:p>
+        </p:txBody>
+      </p:sp>
+      <p:pic>
+        <p:nvPicPr>
+          <p:cNvPr id="4" name="Picture 3">
+            <a:extLst>
+              <a:ext uri="{FF2B5EF4-FFF2-40B4-BE49-F238E27FC236}">
+                <a16:creationId xmlns:a16="http://schemas.microsoft.com/office/drawing/2014/main" id="{1BFAE9EA-1773-440A-A202-9BC807B16BC0}"/>
+              </a:ext>
+            </a:extLst>
+          </p:cNvPr>
+          <p:cNvPicPr>
+            <a:picLocks noChangeAspect="1"/>
+          </p:cNvPicPr>
+          <p:nvPr/>
+        </p:nvPicPr>
+        <p:blipFill>
+          <a:blip r:embed="rId2"/>
+          <a:stretch>
+            <a:fillRect/>
+          </a:stretch>
+        </p:blipFill>
+        <p:spPr>
+          <a:xfrm>
+            <a:off x="243818" y="811161"/>
+            <a:ext cx="6585685" cy="5007077"/>
+          </a:xfrm>
+          <a:prstGeom prst="rect">
+            <a:avLst/>
+          </a:prstGeom>
+        </p:spPr>
+      </p:pic>
+      <p:sp>
+        <p:nvSpPr>
+          <p:cNvPr id="5" name="TextBox 4">
+            <a:extLst>
+              <a:ext uri="{FF2B5EF4-FFF2-40B4-BE49-F238E27FC236}">
+                <a16:creationId xmlns:a16="http://schemas.microsoft.com/office/drawing/2014/main" id="{A925F4C6-8F7D-4D3D-9DC0-1791307FFDF5}"/>
+              </a:ext>
+            </a:extLst>
+          </p:cNvPr>
+          <p:cNvSpPr txBox="1"/>
+          <p:nvPr/>
+        </p:nvSpPr>
+        <p:spPr>
+          <a:xfrm>
+            <a:off x="5317793" y="685068"/>
+            <a:ext cx="3023419" cy="461665"/>
+          </a:xfrm>
+          <a:prstGeom prst="rect">
+            <a:avLst/>
+          </a:prstGeom>
+          <a:noFill/>
+        </p:spPr>
+        <p:txBody>
+          <a:bodyPr wrap="square" rtlCol="0">
+            <a:spAutoFit/>
           </a:bodyPr>
           <a:lstStyle/>
           <a:p>
             <a:r>
-              <a:rPr lang="en-US" dirty="0">
-                <a:hlinkClick r:id="rId2"/>
+              <a:rPr lang="en-US" sz="2400" b="1" dirty="0">
+                <a:solidFill>
+                  <a:srgbClr val="FF0000"/>
+                </a:solidFill>
               </a:rPr>
-              <a:t>https://www.cnet.com/news/five-ways-to-protect-yourself-from-wi-fi-honeypots/#!</a:t>
-            </a:r>
-          </a:p>
-          <a:p>
-            <a:r>
-              <a:rPr lang="en-US" b="1" dirty="0"/>
-              <a:t>1. Turn off Wi-Fi capabilities when you’re not using them</a:t>
-            </a:r>
-            <a:endParaRPr lang="en-US" dirty="0"/>
-          </a:p>
-          <a:p>
-            <a:r>
-              <a:rPr lang="en-US" b="1" dirty="0"/>
-              <a:t>2. Avoid open Wi-Fi networks</a:t>
-            </a:r>
-          </a:p>
-          <a:p>
-            <a:pPr lvl="1"/>
-            <a:r>
-              <a:rPr lang="en-US" dirty="0"/>
-              <a:t>Anyone can connect to these networks. They are unmonitored and no one is watching. </a:t>
-            </a:r>
-          </a:p>
-          <a:p>
-            <a:r>
-              <a:rPr lang="en-US" b="1" dirty="0"/>
-              <a:t>3. Use a VPN</a:t>
-            </a:r>
-            <a:endParaRPr lang="en-US" dirty="0"/>
-          </a:p>
-          <a:p>
-            <a:r>
-              <a:rPr lang="en-US" b="1" dirty="0"/>
-              <a:t>4. Do not leave obsolete devices connected to networks</a:t>
-            </a:r>
-          </a:p>
-          <a:p>
-            <a:pPr lvl="1"/>
-            <a:r>
-              <a:rPr lang="en-US" dirty="0"/>
-              <a:t>The weakest link in a network is an entry point that can be exploited for easy access to other devices</a:t>
-            </a:r>
-          </a:p>
-          <a:p>
-            <a:r>
-              <a:rPr lang="en-US" b="1" dirty="0"/>
-              <a:t>5. Change your passwords often</a:t>
-            </a:r>
-          </a:p>
-          <a:p>
-            <a:pPr lvl="1"/>
-            <a:r>
-              <a:rPr lang="en-US" dirty="0"/>
-              <a:t>Keep 3-5 unique passwords or similar variants of 2-3 passwords</a:t>
-            </a:r>
-          </a:p>
-          <a:p>
-            <a:r>
-              <a:rPr lang="en-US" b="1" dirty="0"/>
-              <a:t>6. Don’t click on suspicious links</a:t>
+              <a:t>bridge.sh</a:t>
+            </a:r>
+          </a:p>
+        </p:txBody>
+      </p:sp>
+      <p:pic>
+        <p:nvPicPr>
+          <p:cNvPr id="6" name="Picture 5">
+            <a:extLst>
+              <a:ext uri="{FF2B5EF4-FFF2-40B4-BE49-F238E27FC236}">
+                <a16:creationId xmlns:a16="http://schemas.microsoft.com/office/drawing/2014/main" id="{EA8B78EE-AC18-43CB-88DE-D460484E9F1A}"/>
+              </a:ext>
+            </a:extLst>
+          </p:cNvPr>
+          <p:cNvPicPr>
+            <a:picLocks noChangeAspect="1"/>
+          </p:cNvPicPr>
+          <p:nvPr/>
+        </p:nvPicPr>
+        <p:blipFill>
+          <a:blip r:embed="rId3"/>
+          <a:stretch>
+            <a:fillRect/>
+          </a:stretch>
+        </p:blipFill>
+        <p:spPr>
+          <a:xfrm>
+            <a:off x="6944562" y="1563790"/>
+            <a:ext cx="4849845" cy="3392896"/>
+          </a:xfrm>
+          <a:prstGeom prst="rect">
+            <a:avLst/>
+          </a:prstGeom>
+        </p:spPr>
+      </p:pic>
+      <p:sp>
+        <p:nvSpPr>
+          <p:cNvPr id="7" name="TextBox 6">
+            <a:extLst>
+              <a:ext uri="{FF2B5EF4-FFF2-40B4-BE49-F238E27FC236}">
+                <a16:creationId xmlns:a16="http://schemas.microsoft.com/office/drawing/2014/main" id="{EE908863-BC8D-4BE8-8842-43050BBB06B6}"/>
+              </a:ext>
+            </a:extLst>
+          </p:cNvPr>
+          <p:cNvSpPr txBox="1"/>
+          <p:nvPr/>
+        </p:nvSpPr>
+        <p:spPr>
+          <a:xfrm>
+            <a:off x="9728549" y="1563790"/>
+            <a:ext cx="3023419" cy="461665"/>
+          </a:xfrm>
+          <a:prstGeom prst="rect">
+            <a:avLst/>
+          </a:prstGeom>
+          <a:noFill/>
+        </p:spPr>
+        <p:txBody>
+          <a:bodyPr wrap="square" rtlCol="0">
+            <a:spAutoFit/>
+          </a:bodyPr>
+          <a:lstStyle/>
+          <a:p>
+            <a:r>
+              <a:rPr lang="en-US" sz="2400" b="1" dirty="0">
+                <a:solidFill>
+                  <a:srgbClr val="FF0000"/>
+                </a:solidFill>
+              </a:rPr>
+              <a:t>startserver.sh</a:t>
             </a:r>
           </a:p>
         </p:txBody>
@@ -5306,7 +6014,7 @@
     </p:spTree>
     <p:extLst>
       <p:ext uri="{BB962C8B-B14F-4D97-AF65-F5344CB8AC3E}">
-        <p14:creationId xmlns:p14="http://schemas.microsoft.com/office/powerpoint/2010/main" val="1435101913"/>
+        <p14:creationId xmlns:p14="http://schemas.microsoft.com/office/powerpoint/2010/main" val="2723558904"/>
       </p:ext>
     </p:extLst>
   </p:cSld>
@@ -5338,7 +6046,7 @@
           <p:cNvPr id="2" name="Title 1">
             <a:extLst>
               <a:ext uri="{FF2B5EF4-FFF2-40B4-BE49-F238E27FC236}">
-                <a16:creationId xmlns:a16="http://schemas.microsoft.com/office/drawing/2014/main" id="{BA87FAF2-CEAE-4253-BFA5-15A6826B2F26}"/>
+                <a16:creationId xmlns:a16="http://schemas.microsoft.com/office/drawing/2014/main" id="{002D7D67-EA2A-4746-B76B-945248EB3B01}"/>
               </a:ext>
             </a:extLst>
           </p:cNvPr>
@@ -5354,10 +6062,204 @@
           <a:bodyPr/>
           <a:lstStyle/>
           <a:p>
-            <a:pPr algn="ctr"/>
+            <a:endParaRPr lang="en-US"/>
+          </a:p>
+        </p:txBody>
+      </p:sp>
+      <p:pic>
+        <p:nvPicPr>
+          <p:cNvPr id="5" name="Content Placeholder 4">
+            <a:extLst>
+              <a:ext uri="{FF2B5EF4-FFF2-40B4-BE49-F238E27FC236}">
+                <a16:creationId xmlns:a16="http://schemas.microsoft.com/office/drawing/2014/main" id="{0FEF0B4D-81E7-46E4-8A2A-A8B849153606}"/>
+              </a:ext>
+            </a:extLst>
+          </p:cNvPr>
+          <p:cNvPicPr>
+            <a:picLocks noGrp="1" noChangeAspect="1"/>
+          </p:cNvPicPr>
+          <p:nvPr>
+            <p:ph idx="1"/>
+          </p:nvPr>
+        </p:nvPicPr>
+        <p:blipFill>
+          <a:blip r:embed="rId2"/>
+          <a:stretch>
+            <a:fillRect/>
+          </a:stretch>
+        </p:blipFill>
+        <p:spPr>
+          <a:xfrm>
+            <a:off x="1524000" y="3716986"/>
+            <a:ext cx="9144000" cy="2743200"/>
+          </a:xfrm>
+          <a:prstGeom prst="rect">
+            <a:avLst/>
+          </a:prstGeom>
+        </p:spPr>
+      </p:pic>
+      <p:pic>
+        <p:nvPicPr>
+          <p:cNvPr id="4" name="Picture 3">
+            <a:extLst>
+              <a:ext uri="{FF2B5EF4-FFF2-40B4-BE49-F238E27FC236}">
+                <a16:creationId xmlns:a16="http://schemas.microsoft.com/office/drawing/2014/main" id="{3B06A1FA-EB33-458F-A8EB-AE14A0908BEC}"/>
+              </a:ext>
+            </a:extLst>
+          </p:cNvPr>
+          <p:cNvPicPr>
+            <a:picLocks noChangeAspect="1"/>
+          </p:cNvPicPr>
+          <p:nvPr/>
+        </p:nvPicPr>
+        <p:blipFill>
+          <a:blip r:embed="rId3"/>
+          <a:stretch>
+            <a:fillRect/>
+          </a:stretch>
+        </p:blipFill>
+        <p:spPr>
+          <a:xfrm>
+            <a:off x="1524000" y="270872"/>
+            <a:ext cx="9144000" cy="3380198"/>
+          </a:xfrm>
+          <a:prstGeom prst="rect">
+            <a:avLst/>
+          </a:prstGeom>
+        </p:spPr>
+      </p:pic>
+      <p:sp>
+        <p:nvSpPr>
+          <p:cNvPr id="7" name="TextBox 6">
+            <a:extLst>
+              <a:ext uri="{FF2B5EF4-FFF2-40B4-BE49-F238E27FC236}">
+                <a16:creationId xmlns:a16="http://schemas.microsoft.com/office/drawing/2014/main" id="{92E93A00-E08B-4038-9C54-69A732631557}"/>
+              </a:ext>
+            </a:extLst>
+          </p:cNvPr>
+          <p:cNvSpPr txBox="1"/>
+          <p:nvPr/>
+        </p:nvSpPr>
+        <p:spPr>
+          <a:xfrm>
+            <a:off x="9156290" y="242414"/>
+            <a:ext cx="3023419" cy="461665"/>
+          </a:xfrm>
+          <a:prstGeom prst="rect">
+            <a:avLst/>
+          </a:prstGeom>
+          <a:noFill/>
+        </p:spPr>
+        <p:txBody>
+          <a:bodyPr wrap="square" rtlCol="0">
+            <a:spAutoFit/>
+          </a:bodyPr>
+          <a:lstStyle/>
+          <a:p>
+            <a:r>
+              <a:rPr lang="en-US" sz="2400" b="1" dirty="0">
+                <a:solidFill>
+                  <a:srgbClr val="FF0000"/>
+                </a:solidFill>
+              </a:rPr>
+              <a:t>spoof.sh</a:t>
+            </a:r>
+          </a:p>
+        </p:txBody>
+      </p:sp>
+      <p:sp>
+        <p:nvSpPr>
+          <p:cNvPr id="8" name="TextBox 7">
+            <a:extLst>
+              <a:ext uri="{FF2B5EF4-FFF2-40B4-BE49-F238E27FC236}">
+                <a16:creationId xmlns:a16="http://schemas.microsoft.com/office/drawing/2014/main" id="{1B5781FF-BAFF-4943-9B8C-D833C88718E1}"/>
+              </a:ext>
+            </a:extLst>
+          </p:cNvPr>
+          <p:cNvSpPr txBox="1"/>
+          <p:nvPr/>
+        </p:nvSpPr>
+        <p:spPr>
+          <a:xfrm>
+            <a:off x="9087465" y="3696997"/>
+            <a:ext cx="3023419" cy="461665"/>
+          </a:xfrm>
+          <a:prstGeom prst="rect">
+            <a:avLst/>
+          </a:prstGeom>
+          <a:noFill/>
+        </p:spPr>
+        <p:txBody>
+          <a:bodyPr wrap="square" rtlCol="0">
+            <a:spAutoFit/>
+          </a:bodyPr>
+          <a:lstStyle/>
+          <a:p>
+            <a:r>
+              <a:rPr lang="en-US" sz="2400" b="1" dirty="0">
+                <a:solidFill>
+                  <a:srgbClr val="FF0000"/>
+                </a:solidFill>
+              </a:rPr>
+              <a:t>deauth.sh</a:t>
+            </a:r>
+          </a:p>
+        </p:txBody>
+      </p:sp>
+    </p:spTree>
+    <p:extLst>
+      <p:ext uri="{BB962C8B-B14F-4D97-AF65-F5344CB8AC3E}">
+        <p14:creationId xmlns:p14="http://schemas.microsoft.com/office/powerpoint/2010/main" val="3346881599"/>
+      </p:ext>
+    </p:extLst>
+  </p:cSld>
+  <p:clrMapOvr>
+    <a:masterClrMapping/>
+  </p:clrMapOvr>
+</p:sld>
+</file>
+
+<file path=ppt/slides/slide9.xml><?xml version="1.0" encoding="utf-8"?>
+<p:sld xmlns:a="http://schemas.openxmlformats.org/drawingml/2006/main" xmlns:r="http://schemas.openxmlformats.org/officeDocument/2006/relationships" xmlns:p="http://schemas.openxmlformats.org/presentationml/2006/main">
+  <p:cSld>
+    <p:spTree>
+      <p:nvGrpSpPr>
+        <p:cNvPr id="1" name=""/>
+        <p:cNvGrpSpPr/>
+        <p:nvPr/>
+      </p:nvGrpSpPr>
+      <p:grpSpPr>
+        <a:xfrm>
+          <a:off x="0" y="0"/>
+          <a:ext cx="0" cy="0"/>
+          <a:chOff x="0" y="0"/>
+          <a:chExt cx="0" cy="0"/>
+        </a:xfrm>
+      </p:grpSpPr>
+      <p:sp>
+        <p:nvSpPr>
+          <p:cNvPr id="2" name="Title 1">
+            <a:extLst>
+              <a:ext uri="{FF2B5EF4-FFF2-40B4-BE49-F238E27FC236}">
+                <a16:creationId xmlns:a16="http://schemas.microsoft.com/office/drawing/2014/main" id="{41AB9824-B1F6-40A9-B53F-1F0163784CE5}"/>
+              </a:ext>
+            </a:extLst>
+          </p:cNvPr>
+          <p:cNvSpPr>
+            <a:spLocks noGrp="1"/>
+          </p:cNvSpPr>
+          <p:nvPr>
+            <p:ph type="title"/>
+          </p:nvPr>
+        </p:nvSpPr>
+        <p:spPr/>
+        <p:txBody>
+          <a:bodyPr/>
+          <a:lstStyle/>
+          <a:p>
             <a:r>
               <a:rPr lang="en-US" dirty="0"/>
-              <a:t>Tools and Technologies used </a:t>
+              <a:t>Now we can deliver our payload over JavaScript</a:t>
             </a:r>
           </a:p>
         </p:txBody>
@@ -5367,7 +6269,7 @@
           <p:cNvPr id="3" name="Content Placeholder 2">
             <a:extLst>
               <a:ext uri="{FF2B5EF4-FFF2-40B4-BE49-F238E27FC236}">
-                <a16:creationId xmlns:a16="http://schemas.microsoft.com/office/drawing/2014/main" id="{3C921350-040D-4C07-8812-7245D841B388}"/>
+                <a16:creationId xmlns:a16="http://schemas.microsoft.com/office/drawing/2014/main" id="{31FCE7C0-35F9-42AD-B013-33A6C006A6E5}"/>
               </a:ext>
             </a:extLst>
           </p:cNvPr>
@@ -5383,58 +6285,96 @@
           <a:bodyPr/>
           <a:lstStyle/>
           <a:p>
-            <a:r>
-              <a:rPr lang="en-US" dirty="0"/>
-              <a:t>Creating and interacting with our backdoor payload</a:t>
-            </a:r>
-          </a:p>
-          <a:p>
-            <a:pPr lvl="1"/>
-            <a:r>
-              <a:rPr lang="en-US" dirty="0" err="1"/>
-              <a:t>Netcat</a:t>
-            </a:r>
             <a:endParaRPr lang="en-US" dirty="0"/>
           </a:p>
-          <a:p>
-            <a:pPr lvl="1"/>
-            <a:r>
-              <a:rPr lang="en-US" dirty="0"/>
-              <a:t>GNU Bash</a:t>
-            </a:r>
-          </a:p>
-          <a:p>
-            <a:r>
-              <a:rPr lang="en-US" dirty="0"/>
-              <a:t>Creating captive portals</a:t>
-            </a:r>
-          </a:p>
-          <a:p>
-            <a:pPr lvl="1"/>
-            <a:r>
-              <a:rPr lang="en-US" dirty="0"/>
-              <a:t>TCP/IP packets/connections</a:t>
-            </a:r>
-          </a:p>
-          <a:p>
-            <a:pPr lvl="1"/>
-            <a:r>
-              <a:rPr lang="en-US" dirty="0"/>
-              <a:t>JavaScript/HTML </a:t>
-            </a:r>
-          </a:p>
-          <a:p>
-            <a:r>
-              <a:rPr lang="en-US" dirty="0"/>
-              <a:t>Raspberry Pi 4</a:t>
-            </a:r>
+        </p:txBody>
+      </p:sp>
+      <p:pic>
+        <p:nvPicPr>
+          <p:cNvPr id="4" name="Picture 3">
+            <a:extLst>
+              <a:ext uri="{FF2B5EF4-FFF2-40B4-BE49-F238E27FC236}">
+                <a16:creationId xmlns:a16="http://schemas.microsoft.com/office/drawing/2014/main" id="{9BBA84E5-65DB-4137-B1AF-8D438337ED45}"/>
+              </a:ext>
+            </a:extLst>
+          </p:cNvPr>
+          <p:cNvPicPr>
+            <a:picLocks noChangeAspect="1"/>
+          </p:cNvPicPr>
+          <p:nvPr/>
+        </p:nvPicPr>
+        <p:blipFill>
+          <a:blip r:embed="rId2"/>
+          <a:stretch>
+            <a:fillRect/>
+          </a:stretch>
+        </p:blipFill>
+        <p:spPr>
+          <a:xfrm>
+            <a:off x="2236450" y="1942201"/>
+            <a:ext cx="7235354" cy="4330001"/>
+          </a:xfrm>
+          <a:prstGeom prst="rect">
+            <a:avLst/>
+          </a:prstGeom>
+        </p:spPr>
+      </p:pic>
+      <p:sp>
+        <p:nvSpPr>
+          <p:cNvPr id="5" name="Rectangle 4">
+            <a:extLst>
+              <a:ext uri="{FF2B5EF4-FFF2-40B4-BE49-F238E27FC236}">
+                <a16:creationId xmlns:a16="http://schemas.microsoft.com/office/drawing/2014/main" id="{62089AA4-E983-48DC-98F9-40CBEE102269}"/>
+              </a:ext>
+            </a:extLst>
+          </p:cNvPr>
+          <p:cNvSpPr/>
+          <p:nvPr/>
+        </p:nvSpPr>
+        <p:spPr>
+          <a:xfrm>
+            <a:off x="2595065" y="2163330"/>
+            <a:ext cx="6922745" cy="1517274"/>
+          </a:xfrm>
+          <a:prstGeom prst="rect">
+            <a:avLst/>
+          </a:prstGeom>
+          <a:noFill/>
+          <a:ln w="38100">
+            <a:solidFill>
+              <a:schemeClr val="accent2"/>
+            </a:solidFill>
+          </a:ln>
+        </p:spPr>
+        <p:style>
+          <a:lnRef idx="2">
+            <a:schemeClr val="accent1">
+              <a:shade val="50000"/>
+            </a:schemeClr>
+          </a:lnRef>
+          <a:fillRef idx="1">
+            <a:schemeClr val="accent1"/>
+          </a:fillRef>
+          <a:effectRef idx="0">
+            <a:schemeClr val="accent1"/>
+          </a:effectRef>
+          <a:fontRef idx="minor">
+            <a:schemeClr val="lt1"/>
+          </a:fontRef>
+        </p:style>
+        <p:txBody>
+          <a:bodyPr rtlCol="0" anchor="ctr"/>
+          <a:lstStyle/>
+          <a:p>
+            <a:pPr algn="ctr"/>
+            <a:endParaRPr lang="en-US"/>
           </a:p>
         </p:txBody>
       </p:sp>
     </p:spTree>
     <p:extLst>
       <p:ext uri="{BB962C8B-B14F-4D97-AF65-F5344CB8AC3E}">
-        <p14:creationId xmlns:p14="http://schemas.microsoft.com/office/powerpoint/2010/main" val="3540100852"/>
+        <p14:creationId xmlns:p14="http://schemas.microsoft.com/office/powerpoint/2010/main" val="3456488774"/>
       </p:ext>
     </p:extLst>
   </p:cSld>
@@ -5721,6 +6661,24 @@
 </file>
 
 <file path=customXml/item1.xml><?xml version="1.0" encoding="utf-8"?>
+<p:properties xmlns:p="http://schemas.microsoft.com/office/2006/metadata/properties" xmlns:xsi="http://www.w3.org/2001/XMLSchema-instance" xmlns:pc="http://schemas.microsoft.com/office/infopath/2007/PartnerControls">
+  <documentManagement>
+    <Status xmlns="71af3243-3dd4-4a8d-8c0d-dd76da1f02a5">Not started</Status>
+    <MediaServiceKeyPoints xmlns="71af3243-3dd4-4a8d-8c0d-dd76da1f02a5" xsi:nil="true"/>
+  </documentManagement>
+</p:properties>
+</file>
+
+<file path=customXml/item2.xml><?xml version="1.0" encoding="utf-8"?>
+<?mso-contentType ?>
+<FormTemplates xmlns="http://schemas.microsoft.com/sharepoint/v3/contenttype/forms">
+  <Display>DocumentLibraryForm</Display>
+  <Edit>DocumentLibraryForm</Edit>
+  <New>DocumentLibraryForm</New>
+</FormTemplates>
+</file>
+
+<file path=customXml/item3.xml><?xml version="1.0" encoding="utf-8"?>
 <ct:contentTypeSchema xmlns:ct="http://schemas.microsoft.com/office/2006/metadata/contentType" xmlns:ma="http://schemas.microsoft.com/office/2006/metadata/properties/metaAttributes" ct:_="" ma:_="" ma:contentTypeName="Document" ma:contentTypeID="0x01010079F111ED35F8CC479449609E8A0923A6" ma:contentTypeVersion="12" ma:contentTypeDescription="Create a new document." ma:contentTypeScope="" ma:versionID="a410dd7f93c95333ffa1b60ed6adedd1">
   <xsd:schema xmlns:xsd="http://www.w3.org/2001/XMLSchema" xmlns:xs="http://www.w3.org/2001/XMLSchema" xmlns:p="http://schemas.microsoft.com/office/2006/metadata/properties" xmlns:ns2="71af3243-3dd4-4a8d-8c0d-dd76da1f02a5" xmlns:ns3="16c05727-aa75-4e4a-9b5f-8a80a1165891" targetNamespace="http://schemas.microsoft.com/office/2006/metadata/properties" ma:root="true" ma:fieldsID="a936d9baba76aa3866493feff160faab" ns2:_="" ns3:_="">
     <xsd:import namespace="71af3243-3dd4-4a8d-8c0d-dd76da1f02a5"/>
@@ -5941,25 +6899,25 @@
 </ct:contentTypeSchema>
 </file>
 
-<file path=customXml/item2.xml><?xml version="1.0" encoding="utf-8"?>
-<?mso-contentType ?>
-<FormTemplates xmlns="http://schemas.microsoft.com/sharepoint/v3/contenttype/forms">
-  <Display>DocumentLibraryForm</Display>
-  <Edit>DocumentLibraryForm</Edit>
-  <New>DocumentLibraryForm</New>
-</FormTemplates>
+<file path=customXml/itemProps1.xml><?xml version="1.0" encoding="utf-8"?>
+<ds:datastoreItem xmlns:ds="http://schemas.openxmlformats.org/officeDocument/2006/customXml" ds:itemID="{137651BA-F45C-4845-9AB3-E0A65B39F5E1}">
+  <ds:schemaRefs>
+    <ds:schemaRef ds:uri="http://schemas.microsoft.com/office/2006/metadata/properties"/>
+    <ds:schemaRef ds:uri="http://schemas.microsoft.com/office/infopath/2007/PartnerControls"/>
+    <ds:schemaRef ds:uri="71af3243-3dd4-4a8d-8c0d-dd76da1f02a5"/>
+  </ds:schemaRefs>
+</ds:datastoreItem>
 </file>
 
-<file path=customXml/item3.xml><?xml version="1.0" encoding="utf-8"?>
-<p:properties xmlns:p="http://schemas.microsoft.com/office/2006/metadata/properties" xmlns:xsi="http://www.w3.org/2001/XMLSchema-instance" xmlns:pc="http://schemas.microsoft.com/office/infopath/2007/PartnerControls">
-  <documentManagement>
-    <Status xmlns="71af3243-3dd4-4a8d-8c0d-dd76da1f02a5">Not started</Status>
-    <MediaServiceKeyPoints xmlns="71af3243-3dd4-4a8d-8c0d-dd76da1f02a5" xsi:nil="true"/>
-  </documentManagement>
-</p:properties>
+<file path=customXml/itemProps2.xml><?xml version="1.0" encoding="utf-8"?>
+<ds:datastoreItem xmlns:ds="http://schemas.openxmlformats.org/officeDocument/2006/customXml" ds:itemID="{CDB58277-F8DF-46FF-84EC-EF41B835E69F}">
+  <ds:schemaRefs>
+    <ds:schemaRef ds:uri="http://schemas.microsoft.com/sharepoint/v3/contenttype/forms"/>
+  </ds:schemaRefs>
+</ds:datastoreItem>
 </file>
 
-<file path=customXml/itemProps1.xml><?xml version="1.0" encoding="utf-8"?>
+<file path=customXml/itemProps3.xml><?xml version="1.0" encoding="utf-8"?>
 <ds:datastoreItem xmlns:ds="http://schemas.openxmlformats.org/officeDocument/2006/customXml" ds:itemID="{2D276E62-80A3-44DD-9BCC-97ED2B99B57F}">
   <ds:schemaRefs>
     <ds:schemaRef ds:uri="http://schemas.microsoft.com/office/2006/metadata/contentType"/>
@@ -5976,22 +6934,4 @@
     <ds:schemaRef ds:uri="http://schemas.microsoft.com/internal/obd"/>
   </ds:schemaRefs>
 </ds:datastoreItem>
-</file>
-
-<file path=customXml/itemProps2.xml><?xml version="1.0" encoding="utf-8"?>
-<ds:datastoreItem xmlns:ds="http://schemas.openxmlformats.org/officeDocument/2006/customXml" ds:itemID="{CDB58277-F8DF-46FF-84EC-EF41B835E69F}">
-  <ds:schemaRefs>
-    <ds:schemaRef ds:uri="http://schemas.microsoft.com/sharepoint/v3/contenttype/forms"/>
-  </ds:schemaRefs>
-</ds:datastoreItem>
-</file>
-
-<file path=customXml/itemProps3.xml><?xml version="1.0" encoding="utf-8"?>
-<ds:datastoreItem xmlns:ds="http://schemas.openxmlformats.org/officeDocument/2006/customXml" ds:itemID="{137651BA-F45C-4845-9AB3-E0A65B39F5E1}">
-  <ds:schemaRefs>
-    <ds:schemaRef ds:uri="http://schemas.microsoft.com/office/2006/metadata/properties"/>
-    <ds:schemaRef ds:uri="http://schemas.microsoft.com/office/infopath/2007/PartnerControls"/>
-    <ds:schemaRef ds:uri="71af3243-3dd4-4a8d-8c0d-dd76da1f02a5"/>
-  </ds:schemaRefs>
-</ds:datastoreItem>
 </file>
</xml_diff>